<commit_message>
MainCard object under Assets
</commit_message>
<xml_diff>
--- a/Assets/Sprites/reciepts_format.pptx
+++ b/Assets/Sprites/reciepts_format.pptx
@@ -5,19 +5,20 @@
     <p:sldMasterId id="2147483648" r:id="rId1"/>
   </p:sldMasterIdLst>
   <p:sldIdLst>
-    <p:sldId id="257" r:id="rId2"/>
-    <p:sldId id="258" r:id="rId3"/>
-    <p:sldId id="259" r:id="rId4"/>
-    <p:sldId id="260" r:id="rId5"/>
-    <p:sldId id="263" r:id="rId6"/>
-    <p:sldId id="270" r:id="rId7"/>
-    <p:sldId id="261" r:id="rId8"/>
-    <p:sldId id="264" r:id="rId9"/>
-    <p:sldId id="265" r:id="rId10"/>
-    <p:sldId id="266" r:id="rId11"/>
-    <p:sldId id="269" r:id="rId12"/>
-    <p:sldId id="267" r:id="rId13"/>
+    <p:sldId id="258" r:id="rId2"/>
+    <p:sldId id="259" r:id="rId3"/>
+    <p:sldId id="260" r:id="rId4"/>
+    <p:sldId id="263" r:id="rId5"/>
+    <p:sldId id="270" r:id="rId6"/>
+    <p:sldId id="261" r:id="rId7"/>
+    <p:sldId id="264" r:id="rId8"/>
+    <p:sldId id="265" r:id="rId9"/>
+    <p:sldId id="266" r:id="rId10"/>
+    <p:sldId id="269" r:id="rId11"/>
+    <p:sldId id="267" r:id="rId12"/>
+    <p:sldId id="272" r:id="rId13"/>
     <p:sldId id="268" r:id="rId14"/>
+    <p:sldId id="271" r:id="rId15"/>
   </p:sldIdLst>
   <p:sldSz cx="12192000" cy="6858000"/>
   <p:notesSz cx="6858000" cy="9144000"/>
@@ -3338,401 +3339,12 @@
           <a:chExt cx="0" cy="0"/>
         </a:xfrm>
       </p:grpSpPr>
-      <p:sp>
-        <p:nvSpPr>
-          <p:cNvPr id="10" name="Rectangle 9">
+      <p:grpSp>
+        <p:nvGrpSpPr>
+          <p:cNvPr id="27" name="Group 26">
             <a:extLst>
               <a:ext uri="{FF2B5EF4-FFF2-40B4-BE49-F238E27FC236}">
-                <a16:creationId xmlns:a16="http://schemas.microsoft.com/office/drawing/2014/main" id="{E4AD598C-FFFC-498B-B5A0-671EB1704D14}"/>
-              </a:ext>
-            </a:extLst>
-          </p:cNvPr>
-          <p:cNvSpPr/>
-          <p:nvPr/>
-        </p:nvSpPr>
-        <p:spPr>
-          <a:xfrm>
-            <a:off x="219821" y="302135"/>
-            <a:ext cx="4132525" cy="5929179"/>
-          </a:xfrm>
-          <a:prstGeom prst="rect">
-            <a:avLst/>
-          </a:prstGeom>
-          <a:solidFill>
-            <a:schemeClr val="bg1">
-              <a:lumMod val="95000"/>
-            </a:schemeClr>
-          </a:solidFill>
-          <a:ln w="177800">
-            <a:solidFill>
-              <a:schemeClr val="tx1"/>
-            </a:solidFill>
-          </a:ln>
-          <a:effectLst>
-            <a:softEdge rad="127000"/>
-          </a:effectLst>
-        </p:spPr>
-        <p:style>
-          <a:lnRef idx="2">
-            <a:schemeClr val="accent1">
-              <a:shade val="50000"/>
-            </a:schemeClr>
-          </a:lnRef>
-          <a:fillRef idx="1">
-            <a:schemeClr val="accent1"/>
-          </a:fillRef>
-          <a:effectRef idx="0">
-            <a:schemeClr val="accent1"/>
-          </a:effectRef>
-          <a:fontRef idx="minor">
-            <a:schemeClr val="lt1"/>
-          </a:fontRef>
-        </p:style>
-        <p:txBody>
-          <a:bodyPr rtlCol="0" anchor="t"/>
-          <a:lstStyle/>
-          <a:p>
-            <a:pPr algn="ctr">
-              <a:lnSpc>
-                <a:spcPct val="200000"/>
-              </a:lnSpc>
-            </a:pPr>
-            <a:r>
-              <a:rPr lang="en-US" sz="4000" b="1" dirty="0">
-                <a:solidFill>
-                  <a:schemeClr val="tx1"/>
-                </a:solidFill>
-                <a:latin typeface="Algerian" panose="04020705040A02060702" pitchFamily="82" charset="0"/>
-              </a:rPr>
-              <a:t>Caesar salad:</a:t>
-            </a:r>
-            <a:endParaRPr lang="en-US" sz="4000" dirty="0">
-              <a:solidFill>
-                <a:schemeClr val="tx1"/>
-              </a:solidFill>
-              <a:latin typeface="Algerian" panose="04020705040A02060702" pitchFamily="82" charset="0"/>
-            </a:endParaRPr>
-          </a:p>
-          <a:p>
-            <a:pPr algn="ctr">
-              <a:lnSpc>
-                <a:spcPct val="200000"/>
-              </a:lnSpc>
-              <a:buSzPct val="150000"/>
-            </a:pPr>
-            <a:r>
-              <a:rPr lang="en-US" sz="4000" dirty="0">
-                <a:solidFill>
-                  <a:schemeClr val="tx1"/>
-                </a:solidFill>
-                <a:latin typeface="Algerian" panose="04020705040A02060702" pitchFamily="82" charset="0"/>
-              </a:rPr>
-              <a:t>    meat</a:t>
-            </a:r>
-          </a:p>
-          <a:p>
-            <a:pPr algn="ctr">
-              <a:lnSpc>
-                <a:spcPct val="200000"/>
-              </a:lnSpc>
-              <a:buSzPct val="150000"/>
-            </a:pPr>
-            <a:r>
-              <a:rPr lang="en-US" sz="4000" dirty="0">
-                <a:solidFill>
-                  <a:schemeClr val="tx1"/>
-                </a:solidFill>
-                <a:latin typeface="Algerian" panose="04020705040A02060702" pitchFamily="82" charset="0"/>
-              </a:rPr>
-              <a:t>        fruit/veg</a:t>
-            </a:r>
-          </a:p>
-          <a:p>
-            <a:pPr algn="ctr">
-              <a:lnSpc>
-                <a:spcPct val="200000"/>
-              </a:lnSpc>
-              <a:buSzPct val="150000"/>
-            </a:pPr>
-            <a:r>
-              <a:rPr lang="en-US" sz="4000" dirty="0">
-                <a:solidFill>
-                  <a:schemeClr val="tx1"/>
-                </a:solidFill>
-                <a:latin typeface="Algerian" panose="04020705040A02060702" pitchFamily="82" charset="0"/>
-              </a:rPr>
-              <a:t>         fruit/veg</a:t>
-            </a:r>
-          </a:p>
-          <a:p>
-            <a:pPr algn="ctr">
-              <a:lnSpc>
-                <a:spcPct val="200000"/>
-              </a:lnSpc>
-            </a:pPr>
-            <a:endParaRPr lang="en-US" sz="4800" dirty="0">
-              <a:solidFill>
-                <a:schemeClr val="tx1"/>
-              </a:solidFill>
-              <a:latin typeface="Algerian" panose="04020705040A02060702" pitchFamily="82" charset="0"/>
-            </a:endParaRPr>
-          </a:p>
-        </p:txBody>
-      </p:sp>
-      <p:pic>
-        <p:nvPicPr>
-          <p:cNvPr id="15" name="Picture 14">
-            <a:extLst>
-              <a:ext uri="{FF2B5EF4-FFF2-40B4-BE49-F238E27FC236}">
-                <a16:creationId xmlns:a16="http://schemas.microsoft.com/office/drawing/2014/main" id="{271E8977-1EA4-439B-BEA6-114566CF786D}"/>
-              </a:ext>
-            </a:extLst>
-          </p:cNvPr>
-          <p:cNvPicPr>
-            <a:picLocks noChangeAspect="1"/>
-          </p:cNvPicPr>
-          <p:nvPr/>
-        </p:nvPicPr>
-        <p:blipFill>
-          <a:blip r:embed="rId2">
-            <a:extLst>
-              <a:ext uri="{BEBA8EAE-BF5A-486C-A8C5-ECC9F3942E4B}">
-                <a14:imgProps xmlns:a14="http://schemas.microsoft.com/office/drawing/2010/main">
-                  <a14:imgLayer r:embed="rId3">
-                    <a14:imgEffect>
-                      <a14:brightnessContrast contrast="40000"/>
-                    </a14:imgEffect>
-                  </a14:imgLayer>
-                </a14:imgProps>
-              </a:ext>
-              <a:ext uri="{28A0092B-C50C-407E-A947-70E740481C1C}">
-                <a14:useLocalDpi xmlns:a14="http://schemas.microsoft.com/office/drawing/2010/main" val="0"/>
-              </a:ext>
-            </a:extLst>
-          </a:blip>
-          <a:stretch>
-            <a:fillRect/>
-          </a:stretch>
-        </p:blipFill>
-        <p:spPr>
-          <a:xfrm>
-            <a:off x="299531" y="1572963"/>
-            <a:ext cx="1354797" cy="1354797"/>
-          </a:xfrm>
-          <a:prstGeom prst="rect">
-            <a:avLst/>
-          </a:prstGeom>
-        </p:spPr>
-      </p:pic>
-      <p:pic>
-        <p:nvPicPr>
-          <p:cNvPr id="25" name="Picture 24">
-            <a:extLst>
-              <a:ext uri="{FF2B5EF4-FFF2-40B4-BE49-F238E27FC236}">
-                <a16:creationId xmlns:a16="http://schemas.microsoft.com/office/drawing/2014/main" id="{71A1817F-A074-4CD3-8149-C27FE1348473}"/>
-              </a:ext>
-            </a:extLst>
-          </p:cNvPr>
-          <p:cNvPicPr>
-            <a:picLocks noChangeAspect="1"/>
-          </p:cNvPicPr>
-          <p:nvPr/>
-        </p:nvPicPr>
-        <p:blipFill>
-          <a:blip r:embed="rId4">
-            <a:clrChange>
-              <a:clrFrom>
-                <a:srgbClr val="FFFFFF"/>
-              </a:clrFrom>
-              <a:clrTo>
-                <a:srgbClr val="FFFFFF">
-                  <a:alpha val="0"/>
-                </a:srgbClr>
-              </a:clrTo>
-            </a:clrChange>
-            <a:extLst>
-              <a:ext uri="{28A0092B-C50C-407E-A947-70E740481C1C}">
-                <a14:useLocalDpi xmlns:a14="http://schemas.microsoft.com/office/drawing/2010/main" val="0"/>
-              </a:ext>
-            </a:extLst>
-          </a:blip>
-          <a:stretch>
-            <a:fillRect/>
-          </a:stretch>
-        </p:blipFill>
-        <p:spPr>
-          <a:xfrm>
-            <a:off x="580315" y="2979727"/>
-            <a:ext cx="782965" cy="898545"/>
-          </a:xfrm>
-          <a:prstGeom prst="rect">
-            <a:avLst/>
-          </a:prstGeom>
-        </p:spPr>
-      </p:pic>
-      <p:pic>
-        <p:nvPicPr>
-          <p:cNvPr id="26" name="Picture 25">
-            <a:extLst>
-              <a:ext uri="{FF2B5EF4-FFF2-40B4-BE49-F238E27FC236}">
-                <a16:creationId xmlns:a16="http://schemas.microsoft.com/office/drawing/2014/main" id="{8C45E397-1AA0-45D4-8B54-2B8F51A8D01B}"/>
-              </a:ext>
-            </a:extLst>
-          </p:cNvPr>
-          <p:cNvPicPr>
-            <a:picLocks noChangeAspect="1"/>
-          </p:cNvPicPr>
-          <p:nvPr/>
-        </p:nvPicPr>
-        <p:blipFill>
-          <a:blip r:embed="rId4">
-            <a:clrChange>
-              <a:clrFrom>
-                <a:srgbClr val="FFFFFF"/>
-              </a:clrFrom>
-              <a:clrTo>
-                <a:srgbClr val="FFFFFF">
-                  <a:alpha val="0"/>
-                </a:srgbClr>
-              </a:clrTo>
-            </a:clrChange>
-            <a:extLst>
-              <a:ext uri="{28A0092B-C50C-407E-A947-70E740481C1C}">
-                <a14:useLocalDpi xmlns:a14="http://schemas.microsoft.com/office/drawing/2010/main" val="0"/>
-              </a:ext>
-            </a:extLst>
-          </a:blip>
-          <a:stretch>
-            <a:fillRect/>
-          </a:stretch>
-        </p:blipFill>
-        <p:spPr>
-          <a:xfrm>
-            <a:off x="580315" y="4263529"/>
-            <a:ext cx="782965" cy="898545"/>
-          </a:xfrm>
-          <a:prstGeom prst="rect">
-            <a:avLst/>
-          </a:prstGeom>
-        </p:spPr>
-      </p:pic>
-      <p:grpSp>
-        <p:nvGrpSpPr>
-          <p:cNvPr id="30" name="Group 29">
-            <a:extLst>
-              <a:ext uri="{FF2B5EF4-FFF2-40B4-BE49-F238E27FC236}">
-                <a16:creationId xmlns:a16="http://schemas.microsoft.com/office/drawing/2014/main" id="{89252801-23C1-4A4C-B020-448359454919}"/>
-              </a:ext>
-            </a:extLst>
-          </p:cNvPr>
-          <p:cNvGrpSpPr/>
-          <p:nvPr/>
-        </p:nvGrpSpPr>
-        <p:grpSpPr>
-          <a:xfrm>
-            <a:off x="1695974" y="5577430"/>
-            <a:ext cx="1043985" cy="471055"/>
-            <a:chOff x="1695974" y="5577430"/>
-            <a:chExt cx="1043985" cy="471055"/>
-          </a:xfrm>
-        </p:grpSpPr>
-        <p:pic>
-          <p:nvPicPr>
-            <p:cNvPr id="12" name="Picture 11">
-              <a:extLst>
-                <a:ext uri="{FF2B5EF4-FFF2-40B4-BE49-F238E27FC236}">
-                  <a16:creationId xmlns:a16="http://schemas.microsoft.com/office/drawing/2014/main" id="{2FE1249F-AB7C-4A4E-8493-765182617B04}"/>
-                </a:ext>
-              </a:extLst>
-            </p:cNvPr>
-            <p:cNvPicPr>
-              <a:picLocks noChangeAspect="1"/>
-            </p:cNvPicPr>
-            <p:nvPr/>
-          </p:nvPicPr>
-          <p:blipFill rotWithShape="1">
-            <a:blip r:embed="rId5">
-              <a:extLst>
-                <a:ext uri="{BEBA8EAE-BF5A-486C-A8C5-ECC9F3942E4B}">
-                  <a14:imgProps xmlns:a14="http://schemas.microsoft.com/office/drawing/2010/main">
-                    <a14:imgLayer r:embed="rId6">
-                      <a14:imgEffect>
-                        <a14:artisticPlasticWrap/>
-                      </a14:imgEffect>
-                      <a14:imgEffect>
-                        <a14:colorTemperature colorTemp="11200"/>
-                      </a14:imgEffect>
-                      <a14:imgEffect>
-                        <a14:saturation sat="400000"/>
-                      </a14:imgEffect>
-                      <a14:imgEffect>
-                        <a14:brightnessContrast contrast="40000"/>
-                      </a14:imgEffect>
-                    </a14:imgLayer>
-                  </a14:imgProps>
-                </a:ext>
-                <a:ext uri="{28A0092B-C50C-407E-A947-70E740481C1C}">
-                  <a14:useLocalDpi xmlns:a14="http://schemas.microsoft.com/office/drawing/2010/main" val="0"/>
-                </a:ext>
-              </a:extLst>
-            </a:blip>
-            <a:srcRect l="28919" t="14445" r="31742" b="43757"/>
-            <a:stretch/>
-          </p:blipFill>
-          <p:spPr>
-            <a:xfrm>
-              <a:off x="2296613" y="5577430"/>
-              <a:ext cx="443346" cy="471055"/>
-            </a:xfrm>
-            <a:prstGeom prst="rect">
-              <a:avLst/>
-            </a:prstGeom>
-          </p:spPr>
-        </p:pic>
-        <p:sp>
-          <p:nvSpPr>
-            <p:cNvPr id="28" name="TextBox 27">
-              <a:extLst>
-                <a:ext uri="{FF2B5EF4-FFF2-40B4-BE49-F238E27FC236}">
-                  <a16:creationId xmlns:a16="http://schemas.microsoft.com/office/drawing/2014/main" id="{605D5B81-0FBB-4094-AC15-C71A9209339E}"/>
-                </a:ext>
-              </a:extLst>
-            </p:cNvPr>
-            <p:cNvSpPr txBox="1"/>
-            <p:nvPr/>
-          </p:nvSpPr>
-          <p:spPr>
-            <a:xfrm>
-              <a:off x="1695974" y="5582124"/>
-              <a:ext cx="660758" cy="461665"/>
-            </a:xfrm>
-            <a:prstGeom prst="rect">
-              <a:avLst/>
-            </a:prstGeom>
-            <a:noFill/>
-          </p:spPr>
-          <p:txBody>
-            <a:bodyPr wrap="none" rtlCol="0">
-              <a:spAutoFit/>
-            </a:bodyPr>
-            <a:lstStyle/>
-            <a:p>
-              <a:r>
-                <a:rPr lang="en-US" sz="2400" b="1" dirty="0">
-                  <a:latin typeface="Algerian" panose="04020705040A02060702" pitchFamily="82" charset="0"/>
-                </a:rPr>
-                <a:t>2 x</a:t>
-              </a:r>
-            </a:p>
-          </p:txBody>
-        </p:sp>
-      </p:grpSp>
-      <p:grpSp>
-        <p:nvGrpSpPr>
-          <p:cNvPr id="34" name="Group 33">
-            <a:extLst>
-              <a:ext uri="{FF2B5EF4-FFF2-40B4-BE49-F238E27FC236}">
-                <a16:creationId xmlns:a16="http://schemas.microsoft.com/office/drawing/2014/main" id="{A828093E-CA0E-487D-B8B8-1B89F2E4F6FC}"/>
+                <a16:creationId xmlns:a16="http://schemas.microsoft.com/office/drawing/2014/main" id="{E8D73697-D539-470C-B533-722B2D336230}"/>
               </a:ext>
             </a:extLst>
           </p:cNvPr>
@@ -3887,6 +3499,165 @@
         </p:sp>
         <p:pic>
           <p:nvPicPr>
+            <p:cNvPr id="17" name="Picture 16">
+              <a:extLst>
+                <a:ext uri="{FF2B5EF4-FFF2-40B4-BE49-F238E27FC236}">
+                  <a16:creationId xmlns:a16="http://schemas.microsoft.com/office/drawing/2014/main" id="{3964288A-DDB1-45B5-8C26-2559F7F3A5FF}"/>
+                </a:ext>
+              </a:extLst>
+            </p:cNvPr>
+            <p:cNvPicPr>
+              <a:picLocks noChangeAspect="1"/>
+            </p:cNvPicPr>
+            <p:nvPr/>
+          </p:nvPicPr>
+          <p:blipFill rotWithShape="1">
+            <a:blip r:embed="rId2">
+              <a:extLst>
+                <a:ext uri="{BEBA8EAE-BF5A-486C-A8C5-ECC9F3942E4B}">
+                  <a14:imgProps xmlns:a14="http://schemas.microsoft.com/office/drawing/2010/main">
+                    <a14:imgLayer r:embed="rId3">
+                      <a14:imgEffect>
+                        <a14:artisticPlasticWrap/>
+                      </a14:imgEffect>
+                      <a14:imgEffect>
+                        <a14:colorTemperature colorTemp="11200"/>
+                      </a14:imgEffect>
+                      <a14:imgEffect>
+                        <a14:saturation sat="400000"/>
+                      </a14:imgEffect>
+                      <a14:imgEffect>
+                        <a14:brightnessContrast contrast="40000"/>
+                      </a14:imgEffect>
+                    </a14:imgLayer>
+                  </a14:imgProps>
+                </a:ext>
+                <a:ext uri="{28A0092B-C50C-407E-A947-70E740481C1C}">
+                  <a14:useLocalDpi xmlns:a14="http://schemas.microsoft.com/office/drawing/2010/main" val="0"/>
+                </a:ext>
+              </a:extLst>
+            </a:blip>
+            <a:srcRect l="28919" t="14445" r="31742" b="43757"/>
+            <a:stretch/>
+          </p:blipFill>
+          <p:spPr>
+            <a:xfrm>
+              <a:off x="6083164" y="5577430"/>
+              <a:ext cx="443346" cy="471055"/>
+            </a:xfrm>
+            <a:prstGeom prst="rect">
+              <a:avLst/>
+            </a:prstGeom>
+          </p:spPr>
+        </p:pic>
+        <p:pic>
+          <p:nvPicPr>
+            <p:cNvPr id="18" name="Picture 17">
+              <a:extLst>
+                <a:ext uri="{FF2B5EF4-FFF2-40B4-BE49-F238E27FC236}">
+                  <a16:creationId xmlns:a16="http://schemas.microsoft.com/office/drawing/2014/main" id="{24A6C095-C502-4DD3-8993-1E4AB18D6BAB}"/>
+                </a:ext>
+              </a:extLst>
+            </p:cNvPr>
+            <p:cNvPicPr>
+              <a:picLocks noChangeAspect="1"/>
+            </p:cNvPicPr>
+            <p:nvPr/>
+          </p:nvPicPr>
+          <p:blipFill rotWithShape="1">
+            <a:blip r:embed="rId2">
+              <a:extLst>
+                <a:ext uri="{BEBA8EAE-BF5A-486C-A8C5-ECC9F3942E4B}">
+                  <a14:imgProps xmlns:a14="http://schemas.microsoft.com/office/drawing/2010/main">
+                    <a14:imgLayer r:embed="rId3">
+                      <a14:imgEffect>
+                        <a14:artisticPlasticWrap/>
+                      </a14:imgEffect>
+                      <a14:imgEffect>
+                        <a14:colorTemperature colorTemp="11200"/>
+                      </a14:imgEffect>
+                      <a14:imgEffect>
+                        <a14:saturation sat="400000"/>
+                      </a14:imgEffect>
+                      <a14:imgEffect>
+                        <a14:brightnessContrast contrast="40000"/>
+                      </a14:imgEffect>
+                    </a14:imgLayer>
+                  </a14:imgProps>
+                </a:ext>
+                <a:ext uri="{28A0092B-C50C-407E-A947-70E740481C1C}">
+                  <a14:useLocalDpi xmlns:a14="http://schemas.microsoft.com/office/drawing/2010/main" val="0"/>
+                </a:ext>
+              </a:extLst>
+            </a:blip>
+            <a:srcRect l="28919" t="14445" r="31742" b="43757"/>
+            <a:stretch/>
+          </p:blipFill>
+          <p:spPr>
+            <a:xfrm>
+              <a:off x="6515668" y="5577430"/>
+              <a:ext cx="443346" cy="471055"/>
+            </a:xfrm>
+            <a:prstGeom prst="rect">
+              <a:avLst/>
+            </a:prstGeom>
+          </p:spPr>
+        </p:pic>
+        <p:pic>
+          <p:nvPicPr>
+            <p:cNvPr id="19" name="Picture 18">
+              <a:extLst>
+                <a:ext uri="{FF2B5EF4-FFF2-40B4-BE49-F238E27FC236}">
+                  <a16:creationId xmlns:a16="http://schemas.microsoft.com/office/drawing/2014/main" id="{5391FD4A-D714-478E-88BE-D6BD71D1EC5F}"/>
+                </a:ext>
+              </a:extLst>
+            </p:cNvPr>
+            <p:cNvPicPr>
+              <a:picLocks noChangeAspect="1"/>
+            </p:cNvPicPr>
+            <p:nvPr/>
+          </p:nvPicPr>
+          <p:blipFill rotWithShape="1">
+            <a:blip r:embed="rId2">
+              <a:extLst>
+                <a:ext uri="{BEBA8EAE-BF5A-486C-A8C5-ECC9F3942E4B}">
+                  <a14:imgProps xmlns:a14="http://schemas.microsoft.com/office/drawing/2010/main">
+                    <a14:imgLayer r:embed="rId3">
+                      <a14:imgEffect>
+                        <a14:artisticPlasticWrap/>
+                      </a14:imgEffect>
+                      <a14:imgEffect>
+                        <a14:colorTemperature colorTemp="11200"/>
+                      </a14:imgEffect>
+                      <a14:imgEffect>
+                        <a14:saturation sat="400000"/>
+                      </a14:imgEffect>
+                      <a14:imgEffect>
+                        <a14:brightnessContrast contrast="40000"/>
+                      </a14:imgEffect>
+                    </a14:imgLayer>
+                  </a14:imgProps>
+                </a:ext>
+                <a:ext uri="{28A0092B-C50C-407E-A947-70E740481C1C}">
+                  <a14:useLocalDpi xmlns:a14="http://schemas.microsoft.com/office/drawing/2010/main" val="0"/>
+                </a:ext>
+              </a:extLst>
+            </a:blip>
+            <a:srcRect l="28919" t="14445" r="31742" b="43757"/>
+            <a:stretch/>
+          </p:blipFill>
+          <p:spPr>
+            <a:xfrm>
+              <a:off x="6929368" y="5577430"/>
+              <a:ext cx="443346" cy="471055"/>
+            </a:xfrm>
+            <a:prstGeom prst="rect">
+              <a:avLst/>
+            </a:prstGeom>
+          </p:spPr>
+        </p:pic>
+        <p:pic>
+          <p:nvPicPr>
             <p:cNvPr id="22" name="Picture 21">
               <a:extLst>
                 <a:ext uri="{FF2B5EF4-FFF2-40B4-BE49-F238E27FC236}">
@@ -4023,154 +3794,13 @@
             </a:prstGeom>
           </p:spPr>
         </p:pic>
-        <p:grpSp>
-          <p:nvGrpSpPr>
-            <p:cNvPr id="31" name="Group 30">
-              <a:extLst>
-                <a:ext uri="{FF2B5EF4-FFF2-40B4-BE49-F238E27FC236}">
-                  <a16:creationId xmlns:a16="http://schemas.microsoft.com/office/drawing/2014/main" id="{EF503C6A-5D34-4107-B6C1-5BB4A6EF6A93}"/>
-                </a:ext>
-              </a:extLst>
-            </p:cNvPr>
-            <p:cNvGrpSpPr/>
-            <p:nvPr/>
-          </p:nvGrpSpPr>
-          <p:grpSpPr>
-            <a:xfrm>
-              <a:off x="6192926" y="5572734"/>
-              <a:ext cx="1043985" cy="471055"/>
-              <a:chOff x="1695974" y="5577430"/>
-              <a:chExt cx="1043985" cy="471055"/>
-            </a:xfrm>
-          </p:grpSpPr>
-          <p:pic>
-            <p:nvPicPr>
-              <p:cNvPr id="32" name="Picture 31">
-                <a:extLst>
-                  <a:ext uri="{FF2B5EF4-FFF2-40B4-BE49-F238E27FC236}">
-                    <a16:creationId xmlns:a16="http://schemas.microsoft.com/office/drawing/2014/main" id="{E77D142D-931E-4123-AD39-347B0B46F333}"/>
-                  </a:ext>
-                </a:extLst>
-              </p:cNvPr>
-              <p:cNvPicPr>
-                <a:picLocks noChangeAspect="1"/>
-              </p:cNvPicPr>
-              <p:nvPr/>
-            </p:nvPicPr>
-            <p:blipFill rotWithShape="1">
-              <a:blip r:embed="rId5">
-                <a:extLst>
-                  <a:ext uri="{BEBA8EAE-BF5A-486C-A8C5-ECC9F3942E4B}">
-                    <a14:imgProps xmlns:a14="http://schemas.microsoft.com/office/drawing/2010/main">
-                      <a14:imgLayer r:embed="rId6">
-                        <a14:imgEffect>
-                          <a14:artisticPlasticWrap/>
-                        </a14:imgEffect>
-                        <a14:imgEffect>
-                          <a14:colorTemperature colorTemp="11200"/>
-                        </a14:imgEffect>
-                        <a14:imgEffect>
-                          <a14:saturation sat="400000"/>
-                        </a14:imgEffect>
-                        <a14:imgEffect>
-                          <a14:brightnessContrast contrast="40000"/>
-                        </a14:imgEffect>
-                      </a14:imgLayer>
-                    </a14:imgProps>
-                  </a:ext>
-                  <a:ext uri="{28A0092B-C50C-407E-A947-70E740481C1C}">
-                    <a14:useLocalDpi xmlns:a14="http://schemas.microsoft.com/office/drawing/2010/main" val="0"/>
-                  </a:ext>
-                </a:extLst>
-              </a:blip>
-              <a:srcRect l="28919" t="14445" r="31742" b="43757"/>
-              <a:stretch/>
-            </p:blipFill>
-            <p:spPr>
-              <a:xfrm>
-                <a:off x="2296613" y="5577430"/>
-                <a:ext cx="443346" cy="471055"/>
-              </a:xfrm>
-              <a:prstGeom prst="rect">
-                <a:avLst/>
-              </a:prstGeom>
-            </p:spPr>
-          </p:pic>
-          <p:sp>
-            <p:nvSpPr>
-              <p:cNvPr id="33" name="TextBox 32">
-                <a:extLst>
-                  <a:ext uri="{FF2B5EF4-FFF2-40B4-BE49-F238E27FC236}">
-                    <a16:creationId xmlns:a16="http://schemas.microsoft.com/office/drawing/2014/main" id="{CB18D55F-E6EB-4484-BF1E-32B07E18D1FA}"/>
-                  </a:ext>
-                </a:extLst>
-              </p:cNvPr>
-              <p:cNvSpPr txBox="1"/>
-              <p:nvPr/>
-            </p:nvSpPr>
-            <p:spPr>
-              <a:xfrm>
-                <a:off x="1695974" y="5582124"/>
-                <a:ext cx="660758" cy="461665"/>
-              </a:xfrm>
-              <a:prstGeom prst="rect">
-                <a:avLst/>
-              </a:prstGeom>
-              <a:noFill/>
-            </p:spPr>
-            <p:txBody>
-              <a:bodyPr wrap="none" rtlCol="0">
-                <a:spAutoFit/>
-              </a:bodyPr>
-              <a:lstStyle/>
-              <a:p>
-                <a:r>
-                  <a:rPr lang="en-US" sz="2400" b="1" dirty="0">
-                    <a:latin typeface="Algerian" panose="04020705040A02060702" pitchFamily="82" charset="0"/>
-                  </a:rPr>
-                  <a:t>3 x</a:t>
-                </a:r>
-              </a:p>
-            </p:txBody>
-          </p:sp>
-        </p:grpSp>
       </p:grpSp>
-    </p:spTree>
-    <p:extLst>
-      <p:ext uri="{BB962C8B-B14F-4D97-AF65-F5344CB8AC3E}">
-        <p14:creationId xmlns:p14="http://schemas.microsoft.com/office/powerpoint/2010/main" val="2916247030"/>
-      </p:ext>
-    </p:extLst>
-  </p:cSld>
-  <p:clrMapOvr>
-    <a:masterClrMapping/>
-  </p:clrMapOvr>
-</p:sld>
-</file>
-
-<file path=ppt/slides/slide10.xml><?xml version="1.0" encoding="utf-8"?>
-<p:sld xmlns:a="http://schemas.openxmlformats.org/drawingml/2006/main" xmlns:r="http://schemas.openxmlformats.org/officeDocument/2006/relationships" xmlns:p="http://schemas.openxmlformats.org/presentationml/2006/main">
-  <p:cSld>
-    <p:spTree>
-      <p:nvGrpSpPr>
-        <p:cNvPr id="1" name=""/>
-        <p:cNvGrpSpPr/>
-        <p:nvPr/>
-      </p:nvGrpSpPr>
-      <p:grpSpPr>
-        <a:xfrm>
-          <a:off x="0" y="0"/>
-          <a:ext cx="0" cy="0"/>
-          <a:chOff x="0" y="0"/>
-          <a:chExt cx="0" cy="0"/>
-        </a:xfrm>
-      </p:grpSpPr>
       <p:grpSp>
         <p:nvGrpSpPr>
-          <p:cNvPr id="8" name="Group 7">
+          <p:cNvPr id="2" name="Group 1">
             <a:extLst>
               <a:ext uri="{FF2B5EF4-FFF2-40B4-BE49-F238E27FC236}">
-                <a16:creationId xmlns:a16="http://schemas.microsoft.com/office/drawing/2014/main" id="{865459E4-828E-498C-8217-DF87F4234815}"/>
+                <a16:creationId xmlns:a16="http://schemas.microsoft.com/office/drawing/2014/main" id="{29C9E439-ABA8-4F01-8F50-547365716FFF}"/>
               </a:ext>
             </a:extLst>
           </p:cNvPr>
@@ -4185,323 +3815,206 @@
             <a:chExt cx="4132525" cy="5929179"/>
           </a:xfrm>
         </p:grpSpPr>
-        <p:grpSp>
-          <p:nvGrpSpPr>
-            <p:cNvPr id="2" name="Group 1">
+        <p:sp>
+          <p:nvSpPr>
+            <p:cNvPr id="10" name="Rectangle 9">
               <a:extLst>
                 <a:ext uri="{FF2B5EF4-FFF2-40B4-BE49-F238E27FC236}">
-                  <a16:creationId xmlns:a16="http://schemas.microsoft.com/office/drawing/2014/main" id="{D29A4326-F822-49EC-8D7F-47B44A36FE49}"/>
+                  <a16:creationId xmlns:a16="http://schemas.microsoft.com/office/drawing/2014/main" id="{E4AD598C-FFFC-498B-B5A0-671EB1704D14}"/>
                 </a:ext>
               </a:extLst>
             </p:cNvPr>
-            <p:cNvGrpSpPr/>
+            <p:cNvSpPr/>
             <p:nvPr/>
-          </p:nvGrpSpPr>
-          <p:grpSpPr>
+          </p:nvSpPr>
+          <p:spPr>
             <a:xfrm>
               <a:off x="219821" y="302135"/>
               <a:ext cx="4132525" cy="5929179"/>
-              <a:chOff x="219821" y="302135"/>
-              <a:chExt cx="4132525" cy="5929179"/>
             </a:xfrm>
-          </p:grpSpPr>
-          <p:sp>
-            <p:nvSpPr>
-              <p:cNvPr id="10" name="Rectangle 9">
-                <a:extLst>
-                  <a:ext uri="{FF2B5EF4-FFF2-40B4-BE49-F238E27FC236}">
-                    <a16:creationId xmlns:a16="http://schemas.microsoft.com/office/drawing/2014/main" id="{E4AD598C-FFFC-498B-B5A0-671EB1704D14}"/>
-                  </a:ext>
-                </a:extLst>
-              </p:cNvPr>
-              <p:cNvSpPr/>
-              <p:nvPr/>
-            </p:nvSpPr>
-            <p:spPr>
-              <a:xfrm>
-                <a:off x="219821" y="302135"/>
-                <a:ext cx="4132525" cy="5929179"/>
-              </a:xfrm>
-              <a:prstGeom prst="rect">
-                <a:avLst/>
-              </a:prstGeom>
+            <a:prstGeom prst="rect">
+              <a:avLst/>
+            </a:prstGeom>
+            <a:solidFill>
+              <a:schemeClr val="bg1">
+                <a:lumMod val="95000"/>
+              </a:schemeClr>
+            </a:solidFill>
+            <a:ln w="177800">
               <a:solidFill>
-                <a:schemeClr val="bg1">
-                  <a:lumMod val="95000"/>
-                </a:schemeClr>
+                <a:schemeClr val="tx1"/>
               </a:solidFill>
-              <a:ln w="177800">
-                <a:solidFill>
-                  <a:schemeClr val="tx1"/>
-                </a:solidFill>
-              </a:ln>
-              <a:effectLst>
-                <a:softEdge rad="127000"/>
-              </a:effectLst>
-            </p:spPr>
-            <p:style>
-              <a:lnRef idx="2">
-                <a:schemeClr val="accent1">
-                  <a:shade val="50000"/>
-                </a:schemeClr>
-              </a:lnRef>
-              <a:fillRef idx="1">
-                <a:schemeClr val="accent1"/>
-              </a:fillRef>
-              <a:effectRef idx="0">
-                <a:schemeClr val="accent1"/>
-              </a:effectRef>
-              <a:fontRef idx="minor">
-                <a:schemeClr val="lt1"/>
-              </a:fontRef>
-            </p:style>
-            <p:txBody>
-              <a:bodyPr rtlCol="0" anchor="t"/>
-              <a:lstStyle/>
-              <a:p>
-                <a:pPr algn="ctr">
-                  <a:lnSpc>
-                    <a:spcPct val="200000"/>
-                  </a:lnSpc>
-                </a:pPr>
-                <a:r>
-                  <a:rPr lang="en-US" sz="4000" b="1" dirty="0">
-                    <a:solidFill>
-                      <a:schemeClr val="tx1"/>
-                    </a:solidFill>
-                    <a:latin typeface="Algerian" panose="04020705040A02060702" pitchFamily="82" charset="0"/>
-                  </a:rPr>
-                  <a:t>Beef nigiri:</a:t>
-                </a:r>
-                <a:endParaRPr lang="en-US" sz="4000" dirty="0">
+            </a:ln>
+            <a:effectLst>
+              <a:softEdge rad="127000"/>
+            </a:effectLst>
+          </p:spPr>
+          <p:style>
+            <a:lnRef idx="2">
+              <a:schemeClr val="accent1">
+                <a:shade val="50000"/>
+              </a:schemeClr>
+            </a:lnRef>
+            <a:fillRef idx="1">
+              <a:schemeClr val="accent1"/>
+            </a:fillRef>
+            <a:effectRef idx="0">
+              <a:schemeClr val="accent1"/>
+            </a:effectRef>
+            <a:fontRef idx="minor">
+              <a:schemeClr val="lt1"/>
+            </a:fontRef>
+          </p:style>
+          <p:txBody>
+            <a:bodyPr rtlCol="0" anchor="t"/>
+            <a:lstStyle/>
+            <a:p>
+              <a:pPr algn="ctr">
+                <a:lnSpc>
+                  <a:spcPct val="200000"/>
+                </a:lnSpc>
+              </a:pPr>
+              <a:r>
+                <a:rPr lang="en-US" sz="4000" b="1" dirty="0">
                   <a:solidFill>
                     <a:schemeClr val="tx1"/>
                   </a:solidFill>
                   <a:latin typeface="Algerian" panose="04020705040A02060702" pitchFamily="82" charset="0"/>
-                </a:endParaRPr>
-              </a:p>
-              <a:p>
-                <a:pPr algn="ctr">
-                  <a:lnSpc>
-                    <a:spcPct val="200000"/>
-                  </a:lnSpc>
-                  <a:buSzPct val="150000"/>
-                </a:pPr>
-                <a:r>
-                  <a:rPr lang="en-US" sz="4000" dirty="0">
-                    <a:solidFill>
-                      <a:schemeClr val="tx1"/>
-                    </a:solidFill>
-                    <a:latin typeface="Algerian" panose="04020705040A02060702" pitchFamily="82" charset="0"/>
-                  </a:rPr>
-                  <a:t> meat</a:t>
-                </a:r>
-              </a:p>
-              <a:p>
-                <a:pPr algn="ctr">
-                  <a:lnSpc>
-                    <a:spcPct val="200000"/>
-                  </a:lnSpc>
-                  <a:buSzPct val="150000"/>
-                </a:pPr>
-                <a:r>
-                  <a:rPr lang="en-US" sz="4000" dirty="0">
-                    <a:solidFill>
-                      <a:schemeClr val="tx1"/>
-                    </a:solidFill>
-                    <a:latin typeface="Algerian" panose="04020705040A02060702" pitchFamily="82" charset="0"/>
-                  </a:rPr>
-                  <a:t>          fruit/veg</a:t>
-                </a:r>
-              </a:p>
-              <a:p>
-                <a:pPr algn="ctr">
-                  <a:lnSpc>
-                    <a:spcPct val="200000"/>
-                  </a:lnSpc>
-                  <a:buSzPct val="150000"/>
-                </a:pPr>
-                <a:r>
-                  <a:rPr lang="en-US" sz="4000" dirty="0">
-                    <a:solidFill>
-                      <a:schemeClr val="tx1"/>
-                    </a:solidFill>
-                    <a:latin typeface="Algerian" panose="04020705040A02060702" pitchFamily="82" charset="0"/>
-                  </a:rPr>
-                  <a:t>  grain</a:t>
-                </a:r>
-                <a:endParaRPr lang="en-US" sz="4800" dirty="0">
+                </a:rPr>
+                <a:t>Caesar salad:</a:t>
+              </a:r>
+              <a:endParaRPr lang="en-US" sz="4000" dirty="0">
+                <a:solidFill>
+                  <a:schemeClr val="tx1"/>
+                </a:solidFill>
+                <a:latin typeface="Algerian" panose="04020705040A02060702" pitchFamily="82" charset="0"/>
+              </a:endParaRPr>
+            </a:p>
+            <a:p>
+              <a:pPr algn="ctr">
+                <a:lnSpc>
+                  <a:spcPct val="200000"/>
+                </a:lnSpc>
+                <a:buSzPct val="150000"/>
+              </a:pPr>
+              <a:r>
+                <a:rPr lang="en-US" sz="4000" dirty="0">
                   <a:solidFill>
                     <a:schemeClr val="tx1"/>
                   </a:solidFill>
                   <a:latin typeface="Algerian" panose="04020705040A02060702" pitchFamily="82" charset="0"/>
-                </a:endParaRPr>
-              </a:p>
-            </p:txBody>
-          </p:sp>
-          <p:pic>
-            <p:nvPicPr>
-              <p:cNvPr id="15" name="Picture 14">
-                <a:extLst>
-                  <a:ext uri="{FF2B5EF4-FFF2-40B4-BE49-F238E27FC236}">
-                    <a16:creationId xmlns:a16="http://schemas.microsoft.com/office/drawing/2014/main" id="{271E8977-1EA4-439B-BEA6-114566CF786D}"/>
-                  </a:ext>
-                </a:extLst>
-              </p:cNvPr>
-              <p:cNvPicPr>
-                <a:picLocks noChangeAspect="1"/>
-              </p:cNvPicPr>
-              <p:nvPr/>
-            </p:nvPicPr>
-            <p:blipFill>
-              <a:blip r:embed="rId2">
-                <a:extLst>
-                  <a:ext uri="{BEBA8EAE-BF5A-486C-A8C5-ECC9F3942E4B}">
-                    <a14:imgProps xmlns:a14="http://schemas.microsoft.com/office/drawing/2010/main">
-                      <a14:imgLayer r:embed="rId3">
-                        <a14:imgEffect>
-                          <a14:brightnessContrast contrast="40000"/>
-                        </a14:imgEffect>
-                      </a14:imgLayer>
-                    </a14:imgProps>
-                  </a:ext>
-                  <a:ext uri="{28A0092B-C50C-407E-A947-70E740481C1C}">
-                    <a14:useLocalDpi xmlns:a14="http://schemas.microsoft.com/office/drawing/2010/main" val="0"/>
-                  </a:ext>
-                </a:extLst>
-              </a:blip>
-              <a:stretch>
-                <a:fillRect/>
-              </a:stretch>
-            </p:blipFill>
-            <p:spPr>
-              <a:xfrm>
-                <a:off x="376179" y="1513444"/>
-                <a:ext cx="1303647" cy="1303647"/>
-              </a:xfrm>
-              <a:prstGeom prst="rect">
-                <a:avLst/>
-              </a:prstGeom>
-            </p:spPr>
-          </p:pic>
-          <p:grpSp>
-            <p:nvGrpSpPr>
-              <p:cNvPr id="30" name="Group 29">
-                <a:extLst>
-                  <a:ext uri="{FF2B5EF4-FFF2-40B4-BE49-F238E27FC236}">
-                    <a16:creationId xmlns:a16="http://schemas.microsoft.com/office/drawing/2014/main" id="{89252801-23C1-4A4C-B020-448359454919}"/>
-                  </a:ext>
-                </a:extLst>
-              </p:cNvPr>
-              <p:cNvGrpSpPr/>
-              <p:nvPr/>
-            </p:nvGrpSpPr>
-            <p:grpSpPr>
-              <a:xfrm>
-                <a:off x="1695974" y="5577430"/>
-                <a:ext cx="1043985" cy="471055"/>
-                <a:chOff x="1695974" y="5577430"/>
-                <a:chExt cx="1043985" cy="471055"/>
-              </a:xfrm>
-            </p:grpSpPr>
-            <p:pic>
-              <p:nvPicPr>
-                <p:cNvPr id="12" name="Picture 11">
-                  <a:extLst>
-                    <a:ext uri="{FF2B5EF4-FFF2-40B4-BE49-F238E27FC236}">
-                      <a16:creationId xmlns:a16="http://schemas.microsoft.com/office/drawing/2014/main" id="{2FE1249F-AB7C-4A4E-8493-765182617B04}"/>
-                    </a:ext>
-                  </a:extLst>
-                </p:cNvPr>
-                <p:cNvPicPr>
-                  <a:picLocks noChangeAspect="1"/>
-                </p:cNvPicPr>
-                <p:nvPr/>
-              </p:nvPicPr>
-              <p:blipFill rotWithShape="1">
-                <a:blip r:embed="rId4">
-                  <a:extLst>
-                    <a:ext uri="{BEBA8EAE-BF5A-486C-A8C5-ECC9F3942E4B}">
-                      <a14:imgProps xmlns:a14="http://schemas.microsoft.com/office/drawing/2010/main">
-                        <a14:imgLayer r:embed="rId5">
-                          <a14:imgEffect>
-                            <a14:artisticPlasticWrap/>
-                          </a14:imgEffect>
-                          <a14:imgEffect>
-                            <a14:colorTemperature colorTemp="11200"/>
-                          </a14:imgEffect>
-                          <a14:imgEffect>
-                            <a14:saturation sat="400000"/>
-                          </a14:imgEffect>
-                          <a14:imgEffect>
-                            <a14:brightnessContrast contrast="40000"/>
-                          </a14:imgEffect>
-                        </a14:imgLayer>
-                      </a14:imgProps>
-                    </a:ext>
-                    <a:ext uri="{28A0092B-C50C-407E-A947-70E740481C1C}">
-                      <a14:useLocalDpi xmlns:a14="http://schemas.microsoft.com/office/drawing/2010/main" val="0"/>
-                    </a:ext>
-                  </a:extLst>
-                </a:blip>
-                <a:srcRect l="28919" t="14445" r="31742" b="43757"/>
-                <a:stretch/>
-              </p:blipFill>
-              <p:spPr>
-                <a:xfrm>
-                  <a:off x="2296613" y="5577430"/>
-                  <a:ext cx="443346" cy="471055"/>
-                </a:xfrm>
-                <a:prstGeom prst="rect">
-                  <a:avLst/>
-                </a:prstGeom>
-              </p:spPr>
-            </p:pic>
-            <p:sp>
-              <p:nvSpPr>
-                <p:cNvPr id="28" name="TextBox 27">
-                  <a:extLst>
-                    <a:ext uri="{FF2B5EF4-FFF2-40B4-BE49-F238E27FC236}">
-                      <a16:creationId xmlns:a16="http://schemas.microsoft.com/office/drawing/2014/main" id="{605D5B81-0FBB-4094-AC15-C71A9209339E}"/>
-                    </a:ext>
-                  </a:extLst>
-                </p:cNvPr>
-                <p:cNvSpPr txBox="1"/>
-                <p:nvPr/>
-              </p:nvSpPr>
-              <p:spPr>
-                <a:xfrm>
-                  <a:off x="1695974" y="5582124"/>
-                  <a:ext cx="660758" cy="461665"/>
-                </a:xfrm>
-                <a:prstGeom prst="rect">
-                  <a:avLst/>
-                </a:prstGeom>
-                <a:noFill/>
-              </p:spPr>
-              <p:txBody>
-                <a:bodyPr wrap="none" rtlCol="0">
-                  <a:spAutoFit/>
-                </a:bodyPr>
-                <a:lstStyle/>
-                <a:p>
-                  <a:r>
-                    <a:rPr lang="en-US" sz="2400" b="1" dirty="0">
-                      <a:latin typeface="Algerian" panose="04020705040A02060702" pitchFamily="82" charset="0"/>
-                    </a:rPr>
-                    <a:t>1 x</a:t>
-                  </a:r>
-                </a:p>
-              </p:txBody>
-            </p:sp>
-          </p:grpSp>
-        </p:grpSp>
+                </a:rPr>
+                <a:t>    meat</a:t>
+              </a:r>
+            </a:p>
+            <a:p>
+              <a:pPr algn="ctr">
+                <a:lnSpc>
+                  <a:spcPct val="200000"/>
+                </a:lnSpc>
+                <a:buSzPct val="150000"/>
+              </a:pPr>
+              <a:r>
+                <a:rPr lang="en-US" sz="4000" dirty="0">
+                  <a:solidFill>
+                    <a:schemeClr val="tx1"/>
+                  </a:solidFill>
+                  <a:latin typeface="Algerian" panose="04020705040A02060702" pitchFamily="82" charset="0"/>
+                </a:rPr>
+                <a:t>        fruit/veg</a:t>
+              </a:r>
+            </a:p>
+            <a:p>
+              <a:pPr algn="ctr">
+                <a:lnSpc>
+                  <a:spcPct val="200000"/>
+                </a:lnSpc>
+                <a:buSzPct val="150000"/>
+              </a:pPr>
+              <a:r>
+                <a:rPr lang="en-US" sz="4000" dirty="0">
+                  <a:solidFill>
+                    <a:schemeClr val="tx1"/>
+                  </a:solidFill>
+                  <a:latin typeface="Algerian" panose="04020705040A02060702" pitchFamily="82" charset="0"/>
+                </a:rPr>
+                <a:t>         fruit/veg</a:t>
+              </a:r>
+            </a:p>
+            <a:p>
+              <a:pPr algn="ctr">
+                <a:lnSpc>
+                  <a:spcPct val="200000"/>
+                </a:lnSpc>
+              </a:pPr>
+              <a:endParaRPr lang="en-US" sz="4800" dirty="0">
+                <a:solidFill>
+                  <a:schemeClr val="tx1"/>
+                </a:solidFill>
+                <a:latin typeface="Algerian" panose="04020705040A02060702" pitchFamily="82" charset="0"/>
+              </a:endParaRPr>
+            </a:p>
+          </p:txBody>
+        </p:sp>
         <p:pic>
           <p:nvPicPr>
-            <p:cNvPr id="19" name="Picture 18">
+            <p:cNvPr id="12" name="Picture 11">
               <a:extLst>
                 <a:ext uri="{FF2B5EF4-FFF2-40B4-BE49-F238E27FC236}">
-                  <a16:creationId xmlns:a16="http://schemas.microsoft.com/office/drawing/2014/main" id="{374E674B-3F12-41DD-9C0F-4258E0D06A50}"/>
+                  <a16:creationId xmlns:a16="http://schemas.microsoft.com/office/drawing/2014/main" id="{2FE1249F-AB7C-4A4E-8493-765182617B04}"/>
+                </a:ext>
+              </a:extLst>
+            </p:cNvPr>
+            <p:cNvPicPr>
+              <a:picLocks noChangeAspect="1"/>
+            </p:cNvPicPr>
+            <p:nvPr/>
+          </p:nvPicPr>
+          <p:blipFill rotWithShape="1">
+            <a:blip r:embed="rId2">
+              <a:extLst>
+                <a:ext uri="{BEBA8EAE-BF5A-486C-A8C5-ECC9F3942E4B}">
+                  <a14:imgProps xmlns:a14="http://schemas.microsoft.com/office/drawing/2010/main">
+                    <a14:imgLayer r:embed="rId3">
+                      <a14:imgEffect>
+                        <a14:artisticPlasticWrap/>
+                      </a14:imgEffect>
+                      <a14:imgEffect>
+                        <a14:colorTemperature colorTemp="11200"/>
+                      </a14:imgEffect>
+                      <a14:imgEffect>
+                        <a14:saturation sat="400000"/>
+                      </a14:imgEffect>
+                      <a14:imgEffect>
+                        <a14:brightnessContrast contrast="40000"/>
+                      </a14:imgEffect>
+                    </a14:imgLayer>
+                  </a14:imgProps>
+                </a:ext>
+                <a:ext uri="{28A0092B-C50C-407E-A947-70E740481C1C}">
+                  <a14:useLocalDpi xmlns:a14="http://schemas.microsoft.com/office/drawing/2010/main" val="0"/>
+                </a:ext>
+              </a:extLst>
+            </a:blip>
+            <a:srcRect l="28919" t="14445" r="31742" b="43757"/>
+            <a:stretch/>
+          </p:blipFill>
+          <p:spPr>
+            <a:xfrm>
+              <a:off x="2296613" y="5577430"/>
+              <a:ext cx="443346" cy="471055"/>
+            </a:xfrm>
+            <a:prstGeom prst="rect">
+              <a:avLst/>
+            </a:prstGeom>
+          </p:spPr>
+        </p:pic>
+        <p:pic>
+          <p:nvPicPr>
+            <p:cNvPr id="15" name="Picture 14">
+              <a:extLst>
+                <a:ext uri="{FF2B5EF4-FFF2-40B4-BE49-F238E27FC236}">
+                  <a16:creationId xmlns:a16="http://schemas.microsoft.com/office/drawing/2014/main" id="{271E8977-1EA4-439B-BEA6-114566CF786D}"/>
                 </a:ext>
               </a:extLst>
             </p:cNvPr>
@@ -4511,7 +4024,52 @@
             <p:nvPr/>
           </p:nvPicPr>
           <p:blipFill>
-            <a:blip r:embed="rId6">
+            <a:blip r:embed="rId5">
+              <a:extLst>
+                <a:ext uri="{BEBA8EAE-BF5A-486C-A8C5-ECC9F3942E4B}">
+                  <a14:imgProps xmlns:a14="http://schemas.microsoft.com/office/drawing/2010/main">
+                    <a14:imgLayer r:embed="rId6">
+                      <a14:imgEffect>
+                        <a14:brightnessContrast contrast="40000"/>
+                      </a14:imgEffect>
+                    </a14:imgLayer>
+                  </a14:imgProps>
+                </a:ext>
+                <a:ext uri="{28A0092B-C50C-407E-A947-70E740481C1C}">
+                  <a14:useLocalDpi xmlns:a14="http://schemas.microsoft.com/office/drawing/2010/main" val="0"/>
+                </a:ext>
+              </a:extLst>
+            </a:blip>
+            <a:stretch>
+              <a:fillRect/>
+            </a:stretch>
+          </p:blipFill>
+          <p:spPr>
+            <a:xfrm>
+              <a:off x="299531" y="1572963"/>
+              <a:ext cx="1354797" cy="1354797"/>
+            </a:xfrm>
+            <a:prstGeom prst="rect">
+              <a:avLst/>
+            </a:prstGeom>
+          </p:spPr>
+        </p:pic>
+        <p:pic>
+          <p:nvPicPr>
+            <p:cNvPr id="25" name="Picture 24">
+              <a:extLst>
+                <a:ext uri="{FF2B5EF4-FFF2-40B4-BE49-F238E27FC236}">
+                  <a16:creationId xmlns:a16="http://schemas.microsoft.com/office/drawing/2014/main" id="{71A1817F-A074-4CD3-8149-C27FE1348473}"/>
+                </a:ext>
+              </a:extLst>
+            </p:cNvPr>
+            <p:cNvPicPr>
+              <a:picLocks noChangeAspect="1"/>
+            </p:cNvPicPr>
+            <p:nvPr/>
+          </p:nvPicPr>
+          <p:blipFill>
+            <a:blip r:embed="rId4">
               <a:clrChange>
                 <a:clrFrom>
                   <a:srgbClr val="FFFFFF"/>
@@ -4534,8 +4092,8 @@
           </p:blipFill>
           <p:spPr>
             <a:xfrm>
-              <a:off x="581891" y="2975062"/>
-              <a:ext cx="892225" cy="1023934"/>
+              <a:off x="580315" y="2979727"/>
+              <a:ext cx="782965" cy="898545"/>
             </a:xfrm>
             <a:prstGeom prst="rect">
               <a:avLst/>
@@ -4544,10 +4102,10 @@
         </p:pic>
         <p:pic>
           <p:nvPicPr>
-            <p:cNvPr id="7" name="Picture 6">
+            <p:cNvPr id="26" name="Picture 25">
               <a:extLst>
                 <a:ext uri="{FF2B5EF4-FFF2-40B4-BE49-F238E27FC236}">
-                  <a16:creationId xmlns:a16="http://schemas.microsoft.com/office/drawing/2014/main" id="{58E69758-5A25-4F43-B2A5-AEAA65B0B461}"/>
+                  <a16:creationId xmlns:a16="http://schemas.microsoft.com/office/drawing/2014/main" id="{8C45E397-1AA0-45D4-8B54-2B8F51A8D01B}"/>
                 </a:ext>
               </a:extLst>
             </p:cNvPr>
@@ -4557,7 +4115,7 @@
             <p:nvPr/>
           </p:nvPicPr>
           <p:blipFill>
-            <a:blip r:embed="rId7">
+            <a:blip r:embed="rId4">
               <a:clrChange>
                 <a:clrFrom>
                   <a:srgbClr val="FFFFFF"/>
@@ -4580,328 +4138,8 @@
           </p:blipFill>
           <p:spPr>
             <a:xfrm>
-              <a:off x="530440" y="4156967"/>
-              <a:ext cx="1023934" cy="1023934"/>
-            </a:xfrm>
-            <a:prstGeom prst="rect">
-              <a:avLst/>
-            </a:prstGeom>
-          </p:spPr>
-        </p:pic>
-      </p:grpSp>
-      <p:grpSp>
-        <p:nvGrpSpPr>
-          <p:cNvPr id="24" name="Group 23">
-            <a:extLst>
-              <a:ext uri="{FF2B5EF4-FFF2-40B4-BE49-F238E27FC236}">
-                <a16:creationId xmlns:a16="http://schemas.microsoft.com/office/drawing/2014/main" id="{FC1097AB-E6AF-4933-A7E9-1D0792E4EB31}"/>
-              </a:ext>
-            </a:extLst>
-          </p:cNvPr>
-          <p:cNvGrpSpPr/>
-          <p:nvPr/>
-        </p:nvGrpSpPr>
-        <p:grpSpPr>
-          <a:xfrm>
-            <a:off x="4433524" y="302135"/>
-            <a:ext cx="4132525" cy="5929179"/>
-            <a:chOff x="219821" y="302135"/>
-            <a:chExt cx="4132525" cy="5929179"/>
-          </a:xfrm>
-        </p:grpSpPr>
-        <p:grpSp>
-          <p:nvGrpSpPr>
-            <p:cNvPr id="25" name="Group 24">
-              <a:extLst>
-                <a:ext uri="{FF2B5EF4-FFF2-40B4-BE49-F238E27FC236}">
-                  <a16:creationId xmlns:a16="http://schemas.microsoft.com/office/drawing/2014/main" id="{004F3028-0426-42FA-AD01-58F964D5C407}"/>
-                </a:ext>
-              </a:extLst>
-            </p:cNvPr>
-            <p:cNvGrpSpPr/>
-            <p:nvPr/>
-          </p:nvGrpSpPr>
-          <p:grpSpPr>
-            <a:xfrm>
-              <a:off x="219821" y="302135"/>
-              <a:ext cx="4132525" cy="5929179"/>
-              <a:chOff x="219821" y="302135"/>
-              <a:chExt cx="4132525" cy="5929179"/>
-            </a:xfrm>
-          </p:grpSpPr>
-          <p:sp>
-            <p:nvSpPr>
-              <p:cNvPr id="31" name="Rectangle 30">
-                <a:extLst>
-                  <a:ext uri="{FF2B5EF4-FFF2-40B4-BE49-F238E27FC236}">
-                    <a16:creationId xmlns:a16="http://schemas.microsoft.com/office/drawing/2014/main" id="{D19C9FCE-C01B-410F-8204-5BFA55D5E182}"/>
-                  </a:ext>
-                </a:extLst>
-              </p:cNvPr>
-              <p:cNvSpPr/>
-              <p:nvPr/>
-            </p:nvSpPr>
-            <p:spPr>
-              <a:xfrm>
-                <a:off x="219821" y="302135"/>
-                <a:ext cx="4132525" cy="5929179"/>
-              </a:xfrm>
-              <a:prstGeom prst="rect">
-                <a:avLst/>
-              </a:prstGeom>
-              <a:solidFill>
-                <a:schemeClr val="bg1">
-                  <a:lumMod val="95000"/>
-                </a:schemeClr>
-              </a:solidFill>
-              <a:ln w="177800">
-                <a:solidFill>
-                  <a:schemeClr val="tx1"/>
-                </a:solidFill>
-              </a:ln>
-              <a:effectLst>
-                <a:softEdge rad="127000"/>
-              </a:effectLst>
-            </p:spPr>
-            <p:style>
-              <a:lnRef idx="2">
-                <a:schemeClr val="accent1">
-                  <a:shade val="50000"/>
-                </a:schemeClr>
-              </a:lnRef>
-              <a:fillRef idx="1">
-                <a:schemeClr val="accent1"/>
-              </a:fillRef>
-              <a:effectRef idx="0">
-                <a:schemeClr val="accent1"/>
-              </a:effectRef>
-              <a:fontRef idx="minor">
-                <a:schemeClr val="lt1"/>
-              </a:fontRef>
-            </p:style>
-            <p:txBody>
-              <a:bodyPr rtlCol="0" anchor="t"/>
-              <a:lstStyle/>
-              <a:p>
-                <a:pPr algn="ctr">
-                  <a:lnSpc>
-                    <a:spcPct val="200000"/>
-                  </a:lnSpc>
-                </a:pPr>
-                <a:r>
-                  <a:rPr lang="en-US" sz="4000" b="1" dirty="0">
-                    <a:solidFill>
-                      <a:schemeClr val="tx1"/>
-                    </a:solidFill>
-                    <a:latin typeface="Algerian" panose="04020705040A02060702" pitchFamily="82" charset="0"/>
-                  </a:rPr>
-                  <a:t>Beef nigiri :</a:t>
-                </a:r>
-                <a:endParaRPr lang="en-US" sz="4000" dirty="0">
-                  <a:solidFill>
-                    <a:schemeClr val="tx1"/>
-                  </a:solidFill>
-                  <a:latin typeface="Algerian" panose="04020705040A02060702" pitchFamily="82" charset="0"/>
-                </a:endParaRPr>
-              </a:p>
-              <a:p>
-                <a:pPr algn="ctr">
-                  <a:lnSpc>
-                    <a:spcPct val="200000"/>
-                  </a:lnSpc>
-                  <a:buSzPct val="150000"/>
-                </a:pPr>
-                <a:r>
-                  <a:rPr lang="en-US" sz="4000" dirty="0">
-                    <a:solidFill>
-                      <a:schemeClr val="tx1"/>
-                    </a:solidFill>
-                    <a:latin typeface="Algerian" panose="04020705040A02060702" pitchFamily="82" charset="0"/>
-                  </a:rPr>
-                  <a:t> meat</a:t>
-                </a:r>
-              </a:p>
-              <a:p>
-                <a:pPr algn="ctr">
-                  <a:lnSpc>
-                    <a:spcPct val="200000"/>
-                  </a:lnSpc>
-                  <a:buSzPct val="150000"/>
-                </a:pPr>
-                <a:r>
-                  <a:rPr lang="en-US" sz="4000" dirty="0">
-                    <a:solidFill>
-                      <a:schemeClr val="tx1"/>
-                    </a:solidFill>
-                    <a:latin typeface="Algerian" panose="04020705040A02060702" pitchFamily="82" charset="0"/>
-                  </a:rPr>
-                  <a:t>          fruit/veg</a:t>
-                </a:r>
-              </a:p>
-              <a:p>
-                <a:pPr algn="ctr">
-                  <a:lnSpc>
-                    <a:spcPct val="200000"/>
-                  </a:lnSpc>
-                  <a:buSzPct val="150000"/>
-                </a:pPr>
-                <a:r>
-                  <a:rPr lang="en-US" sz="4000" dirty="0">
-                    <a:solidFill>
-                      <a:schemeClr val="tx1"/>
-                    </a:solidFill>
-                    <a:latin typeface="Algerian" panose="04020705040A02060702" pitchFamily="82" charset="0"/>
-                  </a:rPr>
-                  <a:t>  grain</a:t>
-                </a:r>
-                <a:endParaRPr lang="en-US" sz="4800" dirty="0">
-                  <a:solidFill>
-                    <a:schemeClr val="tx1"/>
-                  </a:solidFill>
-                  <a:latin typeface="Algerian" panose="04020705040A02060702" pitchFamily="82" charset="0"/>
-                </a:endParaRPr>
-              </a:p>
-            </p:txBody>
-          </p:sp>
-          <p:pic>
-            <p:nvPicPr>
-              <p:cNvPr id="32" name="Picture 31">
-                <a:extLst>
-                  <a:ext uri="{FF2B5EF4-FFF2-40B4-BE49-F238E27FC236}">
-                    <a16:creationId xmlns:a16="http://schemas.microsoft.com/office/drawing/2014/main" id="{BBB6B205-09F6-4366-AF52-949E7BADB4C7}"/>
-                  </a:ext>
-                </a:extLst>
-              </p:cNvPr>
-              <p:cNvPicPr>
-                <a:picLocks noChangeAspect="1"/>
-              </p:cNvPicPr>
-              <p:nvPr/>
-            </p:nvPicPr>
-            <p:blipFill>
-              <a:blip r:embed="rId2">
-                <a:extLst>
-                  <a:ext uri="{BEBA8EAE-BF5A-486C-A8C5-ECC9F3942E4B}">
-                    <a14:imgProps xmlns:a14="http://schemas.microsoft.com/office/drawing/2010/main">
-                      <a14:imgLayer r:embed="rId3">
-                        <a14:imgEffect>
-                          <a14:brightnessContrast contrast="40000"/>
-                        </a14:imgEffect>
-                      </a14:imgLayer>
-                    </a14:imgProps>
-                  </a:ext>
-                  <a:ext uri="{28A0092B-C50C-407E-A947-70E740481C1C}">
-                    <a14:useLocalDpi xmlns:a14="http://schemas.microsoft.com/office/drawing/2010/main" val="0"/>
-                  </a:ext>
-                </a:extLst>
-              </a:blip>
-              <a:stretch>
-                <a:fillRect/>
-              </a:stretch>
-            </p:blipFill>
-            <p:spPr>
-              <a:xfrm>
-                <a:off x="376179" y="1513444"/>
-                <a:ext cx="1303647" cy="1303647"/>
-              </a:xfrm>
-              <a:prstGeom prst="rect">
-                <a:avLst/>
-              </a:prstGeom>
-            </p:spPr>
-          </p:pic>
-          <p:pic>
-            <p:nvPicPr>
-              <p:cNvPr id="34" name="Picture 33">
-                <a:extLst>
-                  <a:ext uri="{FF2B5EF4-FFF2-40B4-BE49-F238E27FC236}">
-                    <a16:creationId xmlns:a16="http://schemas.microsoft.com/office/drawing/2014/main" id="{ACD33541-348A-4DB4-A72E-740F3538C1EC}"/>
-                  </a:ext>
-                </a:extLst>
-              </p:cNvPr>
-              <p:cNvPicPr>
-                <a:picLocks noChangeAspect="1"/>
-              </p:cNvPicPr>
-              <p:nvPr/>
-            </p:nvPicPr>
-            <p:blipFill rotWithShape="1">
-              <a:blip r:embed="rId4">
-                <a:extLst>
-                  <a:ext uri="{BEBA8EAE-BF5A-486C-A8C5-ECC9F3942E4B}">
-                    <a14:imgProps xmlns:a14="http://schemas.microsoft.com/office/drawing/2010/main">
-                      <a14:imgLayer r:embed="rId5">
-                        <a14:imgEffect>
-                          <a14:artisticPlasticWrap/>
-                        </a14:imgEffect>
-                        <a14:imgEffect>
-                          <a14:colorTemperature colorTemp="11200"/>
-                        </a14:imgEffect>
-                        <a14:imgEffect>
-                          <a14:saturation sat="400000"/>
-                        </a14:imgEffect>
-                        <a14:imgEffect>
-                          <a14:brightnessContrast contrast="40000"/>
-                        </a14:imgEffect>
-                      </a14:imgLayer>
-                    </a14:imgProps>
-                  </a:ext>
-                  <a:ext uri="{28A0092B-C50C-407E-A947-70E740481C1C}">
-                    <a14:useLocalDpi xmlns:a14="http://schemas.microsoft.com/office/drawing/2010/main" val="0"/>
-                  </a:ext>
-                </a:extLst>
-              </a:blip>
-              <a:srcRect l="28919" t="14445" r="31742" b="43757"/>
-              <a:stretch/>
-            </p:blipFill>
-            <p:spPr>
-              <a:xfrm>
-                <a:off x="2064410" y="5577430"/>
-                <a:ext cx="443346" cy="471055"/>
-              </a:xfrm>
-              <a:prstGeom prst="rect">
-                <a:avLst/>
-              </a:prstGeom>
-            </p:spPr>
-          </p:pic>
-        </p:grpSp>
-        <p:pic>
-          <p:nvPicPr>
-            <p:cNvPr id="26" name="Picture 25">
-              <a:extLst>
-                <a:ext uri="{FF2B5EF4-FFF2-40B4-BE49-F238E27FC236}">
-                  <a16:creationId xmlns:a16="http://schemas.microsoft.com/office/drawing/2014/main" id="{8743E825-0200-4FE7-823E-A3EE14383A5D}"/>
-                </a:ext>
-              </a:extLst>
-            </p:cNvPr>
-            <p:cNvPicPr>
-              <a:picLocks noChangeAspect="1"/>
-            </p:cNvPicPr>
-            <p:nvPr/>
-          </p:nvPicPr>
-          <p:blipFill>
-            <a:blip r:embed="rId6">
-              <a:clrChange>
-                <a:clrFrom>
-                  <a:srgbClr val="FFFFFF"/>
-                </a:clrFrom>
-                <a:clrTo>
-                  <a:srgbClr val="FFFFFF">
-                    <a:alpha val="0"/>
-                  </a:srgbClr>
-                </a:clrTo>
-              </a:clrChange>
-              <a:extLst>
-                <a:ext uri="{28A0092B-C50C-407E-A947-70E740481C1C}">
-                  <a14:useLocalDpi xmlns:a14="http://schemas.microsoft.com/office/drawing/2010/main" val="0"/>
-                </a:ext>
-              </a:extLst>
-            </a:blip>
-            <a:stretch>
-              <a:fillRect/>
-            </a:stretch>
-          </p:blipFill>
-          <p:spPr>
-            <a:xfrm>
-              <a:off x="581891" y="2975062"/>
-              <a:ext cx="892225" cy="1023934"/>
+              <a:off x="580315" y="4263529"/>
+              <a:ext cx="782965" cy="898545"/>
             </a:xfrm>
             <a:prstGeom prst="rect">
               <a:avLst/>
@@ -4910,10 +4148,10 @@
         </p:pic>
         <p:pic>
           <p:nvPicPr>
-            <p:cNvPr id="29" name="Picture 28">
+            <p:cNvPr id="20" name="Picture 19">
               <a:extLst>
                 <a:ext uri="{FF2B5EF4-FFF2-40B4-BE49-F238E27FC236}">
-                  <a16:creationId xmlns:a16="http://schemas.microsoft.com/office/drawing/2014/main" id="{C33A8FFE-907A-482E-ACED-A035A735504B}"/>
+                  <a16:creationId xmlns:a16="http://schemas.microsoft.com/office/drawing/2014/main" id="{69C070C4-6D8D-4BFA-81B6-DBB1042E979C}"/>
                 </a:ext>
               </a:extLst>
             </p:cNvPr>
@@ -4922,32 +4160,39 @@
             </p:cNvPicPr>
             <p:nvPr/>
           </p:nvPicPr>
-          <p:blipFill>
-            <a:blip r:embed="rId7">
-              <a:clrChange>
-                <a:clrFrom>
-                  <a:srgbClr val="FFFFFF"/>
-                </a:clrFrom>
-                <a:clrTo>
-                  <a:srgbClr val="FFFFFF">
-                    <a:alpha val="0"/>
-                  </a:srgbClr>
-                </a:clrTo>
-              </a:clrChange>
-              <a:extLst>
+          <p:blipFill rotWithShape="1">
+            <a:blip r:embed="rId2">
+              <a:extLst>
+                <a:ext uri="{BEBA8EAE-BF5A-486C-A8C5-ECC9F3942E4B}">
+                  <a14:imgProps xmlns:a14="http://schemas.microsoft.com/office/drawing/2010/main">
+                    <a14:imgLayer r:embed="rId3">
+                      <a14:imgEffect>
+                        <a14:artisticPlasticWrap/>
+                      </a14:imgEffect>
+                      <a14:imgEffect>
+                        <a14:colorTemperature colorTemp="11200"/>
+                      </a14:imgEffect>
+                      <a14:imgEffect>
+                        <a14:saturation sat="400000"/>
+                      </a14:imgEffect>
+                      <a14:imgEffect>
+                        <a14:brightnessContrast contrast="40000"/>
+                      </a14:imgEffect>
+                    </a14:imgLayer>
+                  </a14:imgProps>
+                </a:ext>
                 <a:ext uri="{28A0092B-C50C-407E-A947-70E740481C1C}">
                   <a14:useLocalDpi xmlns:a14="http://schemas.microsoft.com/office/drawing/2010/main" val="0"/>
                 </a:ext>
               </a:extLst>
             </a:blip>
-            <a:stretch>
-              <a:fillRect/>
-            </a:stretch>
+            <a:srcRect l="28919" t="14445" r="31742" b="43757"/>
+            <a:stretch/>
           </p:blipFill>
           <p:spPr>
             <a:xfrm>
-              <a:off x="530440" y="4156967"/>
-              <a:ext cx="1023934" cy="1023934"/>
+              <a:off x="1853267" y="5577429"/>
+              <a:ext cx="443346" cy="471055"/>
             </a:xfrm>
             <a:prstGeom prst="rect">
               <a:avLst/>
@@ -4958,7 +4203,7 @@
     </p:spTree>
     <p:extLst>
       <p:ext uri="{BB962C8B-B14F-4D97-AF65-F5344CB8AC3E}">
-        <p14:creationId xmlns:p14="http://schemas.microsoft.com/office/powerpoint/2010/main" val="596263107"/>
+        <p14:creationId xmlns:p14="http://schemas.microsoft.com/office/powerpoint/2010/main" val="3786891178"/>
       </p:ext>
     </p:extLst>
   </p:cSld>
@@ -4968,7 +4213,7 @@
 </p:sld>
 </file>
 
-<file path=ppt/slides/slide11.xml><?xml version="1.0" encoding="utf-8"?>
+<file path=ppt/slides/slide10.xml><?xml version="1.0" encoding="utf-8"?>
 <p:sld xmlns:a="http://schemas.openxmlformats.org/drawingml/2006/main" xmlns:r="http://schemas.openxmlformats.org/officeDocument/2006/relationships" xmlns:p="http://schemas.openxmlformats.org/presentationml/2006/main">
   <p:cSld>
     <p:spTree>
@@ -5742,7 +4987,7 @@
 </p:sld>
 </file>
 
-<file path=ppt/slides/slide12.xml><?xml version="1.0" encoding="utf-8"?>
+<file path=ppt/slides/slide11.xml><?xml version="1.0" encoding="utf-8"?>
 <p:sld xmlns:a="http://schemas.openxmlformats.org/drawingml/2006/main" xmlns:r="http://schemas.openxmlformats.org/officeDocument/2006/relationships" xmlns:p="http://schemas.openxmlformats.org/presentationml/2006/main">
   <p:cSld>
     <p:spTree>
@@ -5778,6 +5023,9 @@
             <a:chOff x="647700" y="2743200"/>
             <a:chExt cx="3200400" cy="1371600"/>
           </a:xfrm>
+          <a:solidFill>
+            <a:srgbClr val="FBFBFB"/>
+          </a:solidFill>
         </p:grpSpPr>
         <p:sp>
           <p:nvSpPr>
@@ -5799,11 +5047,7 @@
             <a:prstGeom prst="rect">
               <a:avLst/>
             </a:prstGeom>
-            <a:solidFill>
-              <a:schemeClr val="bg1">
-                <a:lumMod val="95000"/>
-              </a:schemeClr>
-            </a:solidFill>
+            <a:grpFill/>
             <a:ln w="177800">
               <a:solidFill>
                 <a:schemeClr val="tx1"/>
@@ -5899,6 +5143,7 @@
             <a:prstGeom prst="rect">
               <a:avLst/>
             </a:prstGeom>
+            <a:grpFill/>
           </p:spPr>
         </p:pic>
       </p:grpSp>
@@ -5921,6 +5166,9 @@
             <a:chOff x="4495800" y="685800"/>
             <a:chExt cx="3200400" cy="1371600"/>
           </a:xfrm>
+          <a:solidFill>
+            <a:srgbClr val="FBFBFB"/>
+          </a:solidFill>
         </p:grpSpPr>
         <p:sp>
           <p:nvSpPr>
@@ -5942,11 +5190,7 @@
             <a:prstGeom prst="rect">
               <a:avLst/>
             </a:prstGeom>
-            <a:solidFill>
-              <a:schemeClr val="bg1">
-                <a:lumMod val="95000"/>
-              </a:schemeClr>
-            </a:solidFill>
+            <a:grpFill/>
             <a:ln w="177800">
               <a:solidFill>
                 <a:schemeClr val="tx1"/>
@@ -6044,6 +5288,7 @@
             <a:prstGeom prst="rect">
               <a:avLst/>
             </a:prstGeom>
+            <a:grpFill/>
           </p:spPr>
         </p:pic>
       </p:grpSp>
@@ -6066,6 +5311,9 @@
             <a:chOff x="8343900" y="4800600"/>
             <a:chExt cx="3200400" cy="1371600"/>
           </a:xfrm>
+          <a:solidFill>
+            <a:srgbClr val="FBFBFB"/>
+          </a:solidFill>
         </p:grpSpPr>
         <p:sp>
           <p:nvSpPr>
@@ -6087,11 +5335,7 @@
             <a:prstGeom prst="rect">
               <a:avLst/>
             </a:prstGeom>
-            <a:solidFill>
-              <a:schemeClr val="bg1">
-                <a:lumMod val="95000"/>
-              </a:schemeClr>
-            </a:solidFill>
+            <a:grpFill/>
             <a:ln w="177800">
               <a:solidFill>
                 <a:schemeClr val="tx1"/>
@@ -6190,6 +5434,7 @@
             <a:prstGeom prst="rect">
               <a:avLst/>
             </a:prstGeom>
+            <a:grpFill/>
           </p:spPr>
         </p:pic>
       </p:grpSp>
@@ -6212,6 +5457,9 @@
             <a:chOff x="647700" y="2743200"/>
             <a:chExt cx="3200400" cy="1371600"/>
           </a:xfrm>
+          <a:solidFill>
+            <a:srgbClr val="FBFBFB"/>
+          </a:solidFill>
         </p:grpSpPr>
         <p:sp>
           <p:nvSpPr>
@@ -6233,11 +5481,7 @@
             <a:prstGeom prst="rect">
               <a:avLst/>
             </a:prstGeom>
-            <a:solidFill>
-              <a:schemeClr val="bg1">
-                <a:lumMod val="95000"/>
-              </a:schemeClr>
-            </a:solidFill>
+            <a:grpFill/>
             <a:ln w="177800">
               <a:solidFill>
                 <a:schemeClr val="tx1"/>
@@ -6324,6 +5568,7 @@
             <a:prstGeom prst="rect">
               <a:avLst/>
             </a:prstGeom>
+            <a:grpFill/>
           </p:spPr>
         </p:pic>
       </p:grpSp>
@@ -6346,6 +5591,9 @@
             <a:chOff x="4495800" y="685800"/>
             <a:chExt cx="3200400" cy="1371600"/>
           </a:xfrm>
+          <a:solidFill>
+            <a:srgbClr val="FBFBFB"/>
+          </a:solidFill>
         </p:grpSpPr>
         <p:sp>
           <p:nvSpPr>
@@ -6367,11 +5615,7 @@
             <a:prstGeom prst="rect">
               <a:avLst/>
             </a:prstGeom>
-            <a:solidFill>
-              <a:schemeClr val="bg1">
-                <a:lumMod val="95000"/>
-              </a:schemeClr>
-            </a:solidFill>
+            <a:grpFill/>
             <a:ln w="177800">
               <a:solidFill>
                 <a:schemeClr val="tx1"/>
@@ -6460,6 +5704,7 @@
             <a:prstGeom prst="rect">
               <a:avLst/>
             </a:prstGeom>
+            <a:grpFill/>
           </p:spPr>
         </p:pic>
       </p:grpSp>
@@ -6482,6 +5727,9 @@
             <a:chOff x="8343900" y="4800600"/>
             <a:chExt cx="1412885" cy="1371600"/>
           </a:xfrm>
+          <a:solidFill>
+            <a:srgbClr val="FBFBFB"/>
+          </a:solidFill>
         </p:grpSpPr>
         <p:sp>
           <p:nvSpPr>
@@ -6503,11 +5751,7 @@
             <a:prstGeom prst="rect">
               <a:avLst/>
             </a:prstGeom>
-            <a:solidFill>
-              <a:schemeClr val="bg1">
-                <a:lumMod val="95000"/>
-              </a:schemeClr>
-            </a:solidFill>
+            <a:grpFill/>
             <a:ln w="177800">
               <a:solidFill>
                 <a:schemeClr val="tx1"/>
@@ -6591,6 +5835,7 @@
             <a:prstGeom prst="rect">
               <a:avLst/>
             </a:prstGeom>
+            <a:grpFill/>
           </p:spPr>
         </p:pic>
       </p:grpSp>
@@ -6613,6 +5858,9 @@
             <a:chOff x="6260074" y="619991"/>
             <a:chExt cx="3200400" cy="1371600"/>
           </a:xfrm>
+          <a:solidFill>
+            <a:srgbClr val="FBFBFB"/>
+          </a:solidFill>
         </p:grpSpPr>
         <p:sp>
           <p:nvSpPr>
@@ -6634,11 +5882,7 @@
             <a:prstGeom prst="rect">
               <a:avLst/>
             </a:prstGeom>
-            <a:solidFill>
-              <a:schemeClr val="bg1">
-                <a:lumMod val="95000"/>
-              </a:schemeClr>
-            </a:solidFill>
+            <a:grpFill/>
             <a:ln w="177800">
               <a:solidFill>
                 <a:schemeClr val="tx1"/>
@@ -6744,6 +5988,7 @@
             <a:prstGeom prst="rect">
               <a:avLst/>
             </a:prstGeom>
+            <a:grpFill/>
           </p:spPr>
         </p:pic>
       </p:grpSp>
@@ -6766,6 +6011,9 @@
             <a:chOff x="10024078" y="1191677"/>
             <a:chExt cx="1371600" cy="1371600"/>
           </a:xfrm>
+          <a:solidFill>
+            <a:srgbClr val="FBFBFB"/>
+          </a:solidFill>
         </p:grpSpPr>
         <p:sp>
           <p:nvSpPr>
@@ -6787,11 +6035,7 @@
             <a:prstGeom prst="rect">
               <a:avLst/>
             </a:prstGeom>
-            <a:solidFill>
-              <a:schemeClr val="bg1">
-                <a:lumMod val="95000"/>
-              </a:schemeClr>
-            </a:solidFill>
+            <a:grpFill/>
             <a:ln w="177800">
               <a:solidFill>
                 <a:schemeClr val="tx1"/>
@@ -6888,6 +6132,7 @@
             <a:prstGeom prst="rect">
               <a:avLst/>
             </a:prstGeom>
+            <a:grpFill/>
           </p:spPr>
         </p:pic>
       </p:grpSp>
@@ -6904,7 +6149,7 @@
 </p:sld>
 </file>
 
-<file path=ppt/slides/slide13.xml><?xml version="1.0" encoding="utf-8"?>
+<file path=ppt/slides/slide12.xml><?xml version="1.0" encoding="utf-8"?>
 <p:sld xmlns:a="http://schemas.openxmlformats.org/drawingml/2006/main" xmlns:r="http://schemas.openxmlformats.org/officeDocument/2006/relationships" xmlns:p="http://schemas.openxmlformats.org/presentationml/2006/main">
   <p:cSld>
     <p:spTree>
@@ -6923,10 +6168,10 @@
       </p:grpSpPr>
       <p:grpSp>
         <p:nvGrpSpPr>
-          <p:cNvPr id="22" name="Group 21">
+          <p:cNvPr id="4" name="Group 3">
             <a:extLst>
               <a:ext uri="{FF2B5EF4-FFF2-40B4-BE49-F238E27FC236}">
-                <a16:creationId xmlns:a16="http://schemas.microsoft.com/office/drawing/2014/main" id="{1B88C679-540C-4DCA-9CF3-FE5C01EFA492}"/>
+                <a16:creationId xmlns:a16="http://schemas.microsoft.com/office/drawing/2014/main" id="{E40DAAA2-5F4E-4D84-8AFE-DCD0DC91AB29}"/>
               </a:ext>
             </a:extLst>
           </p:cNvPr>
@@ -6935,18 +6180,21 @@
         </p:nvGrpSpPr>
         <p:grpSpPr>
           <a:xfrm>
-            <a:off x="6262403" y="226720"/>
-            <a:ext cx="4132525" cy="5929179"/>
-            <a:chOff x="6262403" y="226720"/>
-            <a:chExt cx="4132525" cy="5929179"/>
+            <a:off x="647700" y="2743200"/>
+            <a:ext cx="3200400" cy="1371600"/>
+            <a:chOff x="647700" y="2743200"/>
+            <a:chExt cx="3200400" cy="1371600"/>
           </a:xfrm>
+          <a:solidFill>
+            <a:srgbClr val="FBFBFB"/>
+          </a:solidFill>
         </p:grpSpPr>
         <p:sp>
           <p:nvSpPr>
-            <p:cNvPr id="14" name="Rectangle 13">
+            <p:cNvPr id="10" name="Rectangle 9">
               <a:extLst>
                 <a:ext uri="{FF2B5EF4-FFF2-40B4-BE49-F238E27FC236}">
-                  <a16:creationId xmlns:a16="http://schemas.microsoft.com/office/drawing/2014/main" id="{E4F3CBF1-DF25-41D7-98C5-84B87917ACD0}"/>
+                  <a16:creationId xmlns:a16="http://schemas.microsoft.com/office/drawing/2014/main" id="{E4AD598C-FFFC-498B-B5A0-671EB1704D14}"/>
                 </a:ext>
               </a:extLst>
             </p:cNvPr>
@@ -6955,17 +6203,13 @@
           </p:nvSpPr>
           <p:spPr>
             <a:xfrm>
-              <a:off x="6262403" y="226720"/>
-              <a:ext cx="4132525" cy="5929179"/>
+              <a:off x="647700" y="2743200"/>
+              <a:ext cx="3200400" cy="1371600"/>
             </a:xfrm>
             <a:prstGeom prst="rect">
               <a:avLst/>
             </a:prstGeom>
-            <a:solidFill>
-              <a:schemeClr val="bg1">
-                <a:lumMod val="95000"/>
-              </a:schemeClr>
-            </a:solidFill>
+            <a:grpFill/>
             <a:ln w="177800">
               <a:solidFill>
                 <a:schemeClr val="tx1"/>
@@ -7000,7 +6244,16 @@
                   <a:spcPct val="200000"/>
                 </a:lnSpc>
               </a:pPr>
-              <a:endParaRPr lang="en-US" sz="4800" dirty="0">
+              <a:r>
+                <a:rPr lang="en-US" sz="4000" b="1" dirty="0">
+                  <a:solidFill>
+                    <a:schemeClr val="tx1"/>
+                  </a:solidFill>
+                  <a:latin typeface="Algerian" panose="04020705040A02060702" pitchFamily="82" charset="0"/>
+                </a:rPr>
+                <a:t>      meat</a:t>
+              </a:r>
+              <a:endParaRPr lang="en-US" sz="4000" dirty="0">
                 <a:solidFill>
                   <a:schemeClr val="tx1"/>
                 </a:solidFill>
@@ -7011,10 +6264,10 @@
         </p:sp>
         <p:pic>
           <p:nvPicPr>
-            <p:cNvPr id="21" name="Picture 20">
+            <p:cNvPr id="15" name="Picture 14">
               <a:extLst>
                 <a:ext uri="{FF2B5EF4-FFF2-40B4-BE49-F238E27FC236}">
-                  <a16:creationId xmlns:a16="http://schemas.microsoft.com/office/drawing/2014/main" id="{94DCFA0F-51ED-4A3A-8B67-558A4269AB01}"/>
+                  <a16:creationId xmlns:a16="http://schemas.microsoft.com/office/drawing/2014/main" id="{271E8977-1EA4-439B-BEA6-114566CF786D}"/>
                 </a:ext>
               </a:extLst>
             </p:cNvPr>
@@ -7025,14 +6278,16 @@
           </p:nvPicPr>
           <p:blipFill>
             <a:blip r:embed="rId2">
-              <a:duotone>
-                <a:prstClr val="black"/>
-                <a:srgbClr val="D9C3A5">
-                  <a:tint val="50000"/>
-                  <a:satMod val="180000"/>
-                </a:srgbClr>
-              </a:duotone>
-              <a:extLst>
+              <a:extLst>
+                <a:ext uri="{BEBA8EAE-BF5A-486C-A8C5-ECC9F3942E4B}">
+                  <a14:imgProps xmlns:a14="http://schemas.microsoft.com/office/drawing/2010/main">
+                    <a14:imgLayer r:embed="rId3">
+                      <a14:imgEffect>
+                        <a14:brightnessContrast contrast="40000"/>
+                      </a14:imgEffect>
+                    </a14:imgLayer>
+                  </a14:imgProps>
+                </a:ext>
                 <a:ext uri="{28A0092B-C50C-407E-A947-70E740481C1C}">
                   <a14:useLocalDpi xmlns:a14="http://schemas.microsoft.com/office/drawing/2010/main" val="0"/>
                 </a:ext>
@@ -7044,51 +6299,22 @@
           </p:blipFill>
           <p:spPr>
             <a:xfrm>
-              <a:off x="6517385" y="1380029"/>
-              <a:ext cx="3622559" cy="3622559"/>
+              <a:off x="796322" y="2874818"/>
+              <a:ext cx="1146235" cy="1117600"/>
             </a:xfrm>
             <a:prstGeom prst="rect">
               <a:avLst/>
             </a:prstGeom>
+            <a:grpFill/>
           </p:spPr>
         </p:pic>
       </p:grpSp>
-    </p:spTree>
-    <p:extLst>
-      <p:ext uri="{BB962C8B-B14F-4D97-AF65-F5344CB8AC3E}">
-        <p14:creationId xmlns:p14="http://schemas.microsoft.com/office/powerpoint/2010/main" val="1961273452"/>
-      </p:ext>
-    </p:extLst>
-  </p:cSld>
-  <p:clrMapOvr>
-    <a:masterClrMapping/>
-  </p:clrMapOvr>
-</p:sld>
-</file>
-
-<file path=ppt/slides/slide2.xml><?xml version="1.0" encoding="utf-8"?>
-<p:sld xmlns:a="http://schemas.openxmlformats.org/drawingml/2006/main" xmlns:r="http://schemas.openxmlformats.org/officeDocument/2006/relationships" xmlns:p="http://schemas.openxmlformats.org/presentationml/2006/main">
-  <p:cSld>
-    <p:spTree>
-      <p:nvGrpSpPr>
-        <p:cNvPr id="1" name=""/>
-        <p:cNvGrpSpPr/>
-        <p:nvPr/>
-      </p:nvGrpSpPr>
-      <p:grpSpPr>
-        <a:xfrm>
-          <a:off x="0" y="0"/>
-          <a:ext cx="0" cy="0"/>
-          <a:chOff x="0" y="0"/>
-          <a:chExt cx="0" cy="0"/>
-        </a:xfrm>
-      </p:grpSpPr>
       <p:grpSp>
         <p:nvGrpSpPr>
-          <p:cNvPr id="27" name="Group 26">
+          <p:cNvPr id="3" name="Group 2">
             <a:extLst>
               <a:ext uri="{FF2B5EF4-FFF2-40B4-BE49-F238E27FC236}">
-                <a16:creationId xmlns:a16="http://schemas.microsoft.com/office/drawing/2014/main" id="{E8D73697-D539-470C-B533-722B2D336230}"/>
+                <a16:creationId xmlns:a16="http://schemas.microsoft.com/office/drawing/2014/main" id="{3BAD919A-1A61-4291-8F60-44C55E86A043}"/>
               </a:ext>
             </a:extLst>
           </p:cNvPr>
@@ -7097,7 +6323,449 @@
         </p:nvGrpSpPr>
         <p:grpSpPr>
           <a:xfrm>
-            <a:off x="4648657" y="302135"/>
+            <a:off x="647700" y="619991"/>
+            <a:ext cx="3200400" cy="1371600"/>
+            <a:chOff x="4495800" y="685800"/>
+            <a:chExt cx="3200400" cy="1371600"/>
+          </a:xfrm>
+          <a:solidFill>
+            <a:srgbClr val="FBFBFB"/>
+          </a:solidFill>
+        </p:grpSpPr>
+        <p:sp>
+          <p:nvSpPr>
+            <p:cNvPr id="41" name="Rectangle 40">
+              <a:extLst>
+                <a:ext uri="{FF2B5EF4-FFF2-40B4-BE49-F238E27FC236}">
+                  <a16:creationId xmlns:a16="http://schemas.microsoft.com/office/drawing/2014/main" id="{B3FDF75D-6A5F-4C7C-BA55-4C82A68FD33C}"/>
+                </a:ext>
+              </a:extLst>
+            </p:cNvPr>
+            <p:cNvSpPr/>
+            <p:nvPr/>
+          </p:nvSpPr>
+          <p:spPr>
+            <a:xfrm>
+              <a:off x="4495800" y="685800"/>
+              <a:ext cx="3200400" cy="1371600"/>
+            </a:xfrm>
+            <a:prstGeom prst="rect">
+              <a:avLst/>
+            </a:prstGeom>
+            <a:grpFill/>
+            <a:ln w="177800">
+              <a:solidFill>
+                <a:schemeClr val="tx1"/>
+              </a:solidFill>
+            </a:ln>
+            <a:effectLst>
+              <a:softEdge rad="127000"/>
+            </a:effectLst>
+          </p:spPr>
+          <p:style>
+            <a:lnRef idx="2">
+              <a:schemeClr val="accent1">
+                <a:shade val="50000"/>
+              </a:schemeClr>
+            </a:lnRef>
+            <a:fillRef idx="1">
+              <a:schemeClr val="accent1"/>
+            </a:fillRef>
+            <a:effectRef idx="0">
+              <a:schemeClr val="accent1"/>
+            </a:effectRef>
+            <a:fontRef idx="minor">
+              <a:schemeClr val="lt1"/>
+            </a:fontRef>
+          </p:style>
+          <p:txBody>
+            <a:bodyPr rtlCol="0" anchor="t"/>
+            <a:lstStyle/>
+            <a:p>
+              <a:pPr algn="ctr">
+                <a:lnSpc>
+                  <a:spcPct val="200000"/>
+                </a:lnSpc>
+                <a:buSzPct val="150000"/>
+              </a:pPr>
+              <a:r>
+                <a:rPr lang="en-US" sz="4000" b="1" dirty="0">
+                  <a:solidFill>
+                    <a:schemeClr val="tx1"/>
+                  </a:solidFill>
+                  <a:latin typeface="Algerian" panose="04020705040A02060702" pitchFamily="82" charset="0"/>
+                </a:rPr>
+                <a:t>      grain</a:t>
+              </a:r>
+              <a:endParaRPr lang="en-US" sz="4800" b="1" dirty="0">
+                <a:solidFill>
+                  <a:schemeClr val="tx1"/>
+                </a:solidFill>
+                <a:latin typeface="Algerian" panose="04020705040A02060702" pitchFamily="82" charset="0"/>
+              </a:endParaRPr>
+            </a:p>
+          </p:txBody>
+        </p:sp>
+        <p:pic>
+          <p:nvPicPr>
+            <p:cNvPr id="40" name="Picture 39">
+              <a:extLst>
+                <a:ext uri="{FF2B5EF4-FFF2-40B4-BE49-F238E27FC236}">
+                  <a16:creationId xmlns:a16="http://schemas.microsoft.com/office/drawing/2014/main" id="{E32ED5ED-2727-4DC6-BBA5-1375951D61E8}"/>
+                </a:ext>
+              </a:extLst>
+            </p:cNvPr>
+            <p:cNvPicPr>
+              <a:picLocks noChangeAspect="1"/>
+            </p:cNvPicPr>
+            <p:nvPr/>
+          </p:nvPicPr>
+          <p:blipFill>
+            <a:blip r:embed="rId4">
+              <a:clrChange>
+                <a:clrFrom>
+                  <a:srgbClr val="FFFFFF"/>
+                </a:clrFrom>
+                <a:clrTo>
+                  <a:srgbClr val="FFFFFF">
+                    <a:alpha val="0"/>
+                  </a:srgbClr>
+                </a:clrTo>
+              </a:clrChange>
+              <a:extLst>
+                <a:ext uri="{28A0092B-C50C-407E-A947-70E740481C1C}">
+                  <a14:useLocalDpi xmlns:a14="http://schemas.microsoft.com/office/drawing/2010/main" val="0"/>
+                </a:ext>
+              </a:extLst>
+            </a:blip>
+            <a:stretch>
+              <a:fillRect/>
+            </a:stretch>
+          </p:blipFill>
+          <p:spPr>
+            <a:xfrm>
+              <a:off x="4644422" y="862632"/>
+              <a:ext cx="1031993" cy="1080654"/>
+            </a:xfrm>
+            <a:prstGeom prst="rect">
+              <a:avLst/>
+            </a:prstGeom>
+            <a:grpFill/>
+          </p:spPr>
+        </p:pic>
+      </p:grpSp>
+      <p:grpSp>
+        <p:nvGrpSpPr>
+          <p:cNvPr id="11" name="Group 10">
+            <a:extLst>
+              <a:ext uri="{FF2B5EF4-FFF2-40B4-BE49-F238E27FC236}">
+                <a16:creationId xmlns:a16="http://schemas.microsoft.com/office/drawing/2014/main" id="{B3F43273-7B6E-4AC6-95C3-7DFA88F03FB3}"/>
+              </a:ext>
+            </a:extLst>
+          </p:cNvPr>
+          <p:cNvGrpSpPr/>
+          <p:nvPr/>
+        </p:nvGrpSpPr>
+        <p:grpSpPr>
+          <a:xfrm>
+            <a:off x="6260074" y="619991"/>
+            <a:ext cx="3200400" cy="1371600"/>
+            <a:chOff x="6260074" y="619991"/>
+            <a:chExt cx="3200400" cy="1371600"/>
+          </a:xfrm>
+          <a:solidFill>
+            <a:srgbClr val="FBFBFB"/>
+          </a:solidFill>
+        </p:grpSpPr>
+        <p:sp>
+          <p:nvSpPr>
+            <p:cNvPr id="21" name="Rectangle 20">
+              <a:extLst>
+                <a:ext uri="{FF2B5EF4-FFF2-40B4-BE49-F238E27FC236}">
+                  <a16:creationId xmlns:a16="http://schemas.microsoft.com/office/drawing/2014/main" id="{D9F434B0-067D-40DB-B6AE-F871279AC01C}"/>
+                </a:ext>
+              </a:extLst>
+            </p:cNvPr>
+            <p:cNvSpPr/>
+            <p:nvPr/>
+          </p:nvSpPr>
+          <p:spPr>
+            <a:xfrm>
+              <a:off x="6260074" y="619991"/>
+              <a:ext cx="3200400" cy="1371600"/>
+            </a:xfrm>
+            <a:prstGeom prst="rect">
+              <a:avLst/>
+            </a:prstGeom>
+            <a:grpFill/>
+            <a:ln w="177800">
+              <a:solidFill>
+                <a:schemeClr val="tx1"/>
+              </a:solidFill>
+            </a:ln>
+            <a:effectLst>
+              <a:softEdge rad="127000"/>
+            </a:effectLst>
+          </p:spPr>
+          <p:style>
+            <a:lnRef idx="2">
+              <a:schemeClr val="accent1">
+                <a:shade val="50000"/>
+              </a:schemeClr>
+            </a:lnRef>
+            <a:fillRef idx="1">
+              <a:schemeClr val="accent1"/>
+            </a:fillRef>
+            <a:effectRef idx="0">
+              <a:schemeClr val="accent1"/>
+            </a:effectRef>
+            <a:fontRef idx="minor">
+              <a:schemeClr val="lt1"/>
+            </a:fontRef>
+          </p:style>
+          <p:txBody>
+            <a:bodyPr rtlCol="0" anchor="t"/>
+            <a:lstStyle/>
+            <a:p>
+              <a:pPr algn="ctr">
+                <a:lnSpc>
+                  <a:spcPct val="200000"/>
+                </a:lnSpc>
+                <a:buSzPct val="150000"/>
+              </a:pPr>
+              <a:r>
+                <a:rPr lang="en-US" sz="4000" b="1" dirty="0">
+                  <a:solidFill>
+                    <a:schemeClr val="tx1"/>
+                  </a:solidFill>
+                  <a:latin typeface="Algerian" panose="04020705040A02060702" pitchFamily="82" charset="0"/>
+                </a:rPr>
+                <a:t>      Dairy</a:t>
+              </a:r>
+              <a:endParaRPr lang="en-US" sz="4800" b="1" dirty="0">
+                <a:solidFill>
+                  <a:schemeClr val="tx1"/>
+                </a:solidFill>
+                <a:latin typeface="Algerian" panose="04020705040A02060702" pitchFamily="82" charset="0"/>
+              </a:endParaRPr>
+            </a:p>
+          </p:txBody>
+        </p:sp>
+        <p:pic>
+          <p:nvPicPr>
+            <p:cNvPr id="8" name="Picture 7">
+              <a:extLst>
+                <a:ext uri="{FF2B5EF4-FFF2-40B4-BE49-F238E27FC236}">
+                  <a16:creationId xmlns:a16="http://schemas.microsoft.com/office/drawing/2014/main" id="{D07D92B7-4544-4E11-83BE-DDE029244894}"/>
+                </a:ext>
+              </a:extLst>
+            </p:cNvPr>
+            <p:cNvPicPr>
+              <a:picLocks noChangeAspect="1"/>
+            </p:cNvPicPr>
+            <p:nvPr/>
+          </p:nvPicPr>
+          <p:blipFill rotWithShape="1">
+            <a:blip r:embed="rId5">
+              <a:clrChange>
+                <a:clrFrom>
+                  <a:srgbClr val="000000"/>
+                </a:clrFrom>
+                <a:clrTo>
+                  <a:srgbClr val="000000">
+                    <a:alpha val="0"/>
+                  </a:srgbClr>
+                </a:clrTo>
+              </a:clrChange>
+              <a:extLst>
+                <a:ext uri="{BEBA8EAE-BF5A-486C-A8C5-ECC9F3942E4B}">
+                  <a14:imgProps xmlns:a14="http://schemas.microsoft.com/office/drawing/2010/main">
+                    <a14:imgLayer r:embed="rId6">
+                      <a14:imgEffect>
+                        <a14:brightnessContrast contrast="40000"/>
+                      </a14:imgEffect>
+                    </a14:imgLayer>
+                  </a14:imgProps>
+                </a:ext>
+                <a:ext uri="{28A0092B-C50C-407E-A947-70E740481C1C}">
+                  <a14:useLocalDpi xmlns:a14="http://schemas.microsoft.com/office/drawing/2010/main" val="0"/>
+                </a:ext>
+              </a:extLst>
+            </a:blip>
+            <a:srcRect l="17843" r="18158"/>
+            <a:stretch/>
+          </p:blipFill>
+          <p:spPr>
+            <a:xfrm>
+              <a:off x="6482141" y="812895"/>
+              <a:ext cx="650180" cy="1015906"/>
+            </a:xfrm>
+            <a:prstGeom prst="rect">
+              <a:avLst/>
+            </a:prstGeom>
+            <a:grpFill/>
+          </p:spPr>
+        </p:pic>
+      </p:grpSp>
+      <p:grpSp>
+        <p:nvGrpSpPr>
+          <p:cNvPr id="9" name="Group 8">
+            <a:extLst>
+              <a:ext uri="{FF2B5EF4-FFF2-40B4-BE49-F238E27FC236}">
+                <a16:creationId xmlns:a16="http://schemas.microsoft.com/office/drawing/2014/main" id="{7A98D256-97EF-4DBC-8A34-4223D8605AC9}"/>
+              </a:ext>
+            </a:extLst>
+          </p:cNvPr>
+          <p:cNvGrpSpPr/>
+          <p:nvPr/>
+        </p:nvGrpSpPr>
+        <p:grpSpPr>
+          <a:xfrm>
+            <a:off x="10024078" y="1191677"/>
+            <a:ext cx="1371600" cy="1371600"/>
+            <a:chOff x="10024078" y="1191677"/>
+            <a:chExt cx="1371600" cy="1371600"/>
+          </a:xfrm>
+          <a:solidFill>
+            <a:srgbClr val="FBFBFB"/>
+          </a:solidFill>
+        </p:grpSpPr>
+        <p:sp>
+          <p:nvSpPr>
+            <p:cNvPr id="24" name="Rectangle 23">
+              <a:extLst>
+                <a:ext uri="{FF2B5EF4-FFF2-40B4-BE49-F238E27FC236}">
+                  <a16:creationId xmlns:a16="http://schemas.microsoft.com/office/drawing/2014/main" id="{BDE703FC-C910-4D82-97A5-E8B81F1765C7}"/>
+                </a:ext>
+              </a:extLst>
+            </p:cNvPr>
+            <p:cNvSpPr/>
+            <p:nvPr/>
+          </p:nvSpPr>
+          <p:spPr>
+            <a:xfrm>
+              <a:off x="10024078" y="1191677"/>
+              <a:ext cx="1371600" cy="1371600"/>
+            </a:xfrm>
+            <a:prstGeom prst="rect">
+              <a:avLst/>
+            </a:prstGeom>
+            <a:grpFill/>
+            <a:ln w="177800">
+              <a:solidFill>
+                <a:schemeClr val="tx1"/>
+              </a:solidFill>
+            </a:ln>
+            <a:effectLst>
+              <a:softEdge rad="127000"/>
+            </a:effectLst>
+          </p:spPr>
+          <p:style>
+            <a:lnRef idx="2">
+              <a:schemeClr val="accent1">
+                <a:shade val="50000"/>
+              </a:schemeClr>
+            </a:lnRef>
+            <a:fillRef idx="1">
+              <a:schemeClr val="accent1"/>
+            </a:fillRef>
+            <a:effectRef idx="0">
+              <a:schemeClr val="accent1"/>
+            </a:effectRef>
+            <a:fontRef idx="minor">
+              <a:schemeClr val="lt1"/>
+            </a:fontRef>
+          </p:style>
+          <p:txBody>
+            <a:bodyPr rtlCol="0" anchor="t"/>
+            <a:lstStyle/>
+            <a:p>
+              <a:pPr algn="ctr">
+                <a:lnSpc>
+                  <a:spcPct val="200000"/>
+                </a:lnSpc>
+                <a:buSzPct val="150000"/>
+              </a:pPr>
+              <a:endParaRPr lang="en-US" sz="4800" b="1" dirty="0">
+                <a:solidFill>
+                  <a:schemeClr val="tx1"/>
+                </a:solidFill>
+                <a:latin typeface="Algerian" panose="04020705040A02060702" pitchFamily="82" charset="0"/>
+              </a:endParaRPr>
+            </a:p>
+          </p:txBody>
+        </p:sp>
+        <p:pic>
+          <p:nvPicPr>
+            <p:cNvPr id="30" name="Picture 29">
+              <a:extLst>
+                <a:ext uri="{FF2B5EF4-FFF2-40B4-BE49-F238E27FC236}">
+                  <a16:creationId xmlns:a16="http://schemas.microsoft.com/office/drawing/2014/main" id="{402BE6D8-018D-4D9B-AE1E-2E3DEFF5EA7D}"/>
+                </a:ext>
+              </a:extLst>
+            </p:cNvPr>
+            <p:cNvPicPr>
+              <a:picLocks noChangeAspect="1"/>
+            </p:cNvPicPr>
+            <p:nvPr/>
+          </p:nvPicPr>
+          <p:blipFill rotWithShape="1">
+            <a:blip r:embed="rId5">
+              <a:clrChange>
+                <a:clrFrom>
+                  <a:srgbClr val="000000"/>
+                </a:clrFrom>
+                <a:clrTo>
+                  <a:srgbClr val="000000">
+                    <a:alpha val="0"/>
+                  </a:srgbClr>
+                </a:clrTo>
+              </a:clrChange>
+              <a:extLst>
+                <a:ext uri="{BEBA8EAE-BF5A-486C-A8C5-ECC9F3942E4B}">
+                  <a14:imgProps xmlns:a14="http://schemas.microsoft.com/office/drawing/2010/main">
+                    <a14:imgLayer r:embed="rId6">
+                      <a14:imgEffect>
+                        <a14:brightnessContrast contrast="40000"/>
+                      </a14:imgEffect>
+                    </a14:imgLayer>
+                  </a14:imgProps>
+                </a:ext>
+                <a:ext uri="{28A0092B-C50C-407E-A947-70E740481C1C}">
+                  <a14:useLocalDpi xmlns:a14="http://schemas.microsoft.com/office/drawing/2010/main" val="0"/>
+                </a:ext>
+              </a:extLst>
+            </a:blip>
+            <a:srcRect l="17843" r="18158"/>
+            <a:stretch/>
+          </p:blipFill>
+          <p:spPr>
+            <a:xfrm>
+              <a:off x="10345599" y="1320848"/>
+              <a:ext cx="728557" cy="1138370"/>
+            </a:xfrm>
+            <a:prstGeom prst="rect">
+              <a:avLst/>
+            </a:prstGeom>
+            <a:grpFill/>
+          </p:spPr>
+        </p:pic>
+      </p:grpSp>
+      <p:grpSp>
+        <p:nvGrpSpPr>
+          <p:cNvPr id="26" name="Group 25">
+            <a:extLst>
+              <a:ext uri="{FF2B5EF4-FFF2-40B4-BE49-F238E27FC236}">
+                <a16:creationId xmlns:a16="http://schemas.microsoft.com/office/drawing/2014/main" id="{2983F866-4307-4676-921B-164E9B0FA15F}"/>
+              </a:ext>
+            </a:extLst>
+          </p:cNvPr>
+          <p:cNvGrpSpPr/>
+          <p:nvPr/>
+        </p:nvGrpSpPr>
+        <p:grpSpPr>
+          <a:xfrm>
+            <a:off x="8059475" y="2743200"/>
             <a:ext cx="4132525" cy="5929179"/>
             <a:chOff x="4648657" y="302135"/>
             <a:chExt cx="4132525" cy="5929179"/>
@@ -7105,10 +6773,10 @@
         </p:grpSpPr>
         <p:sp>
           <p:nvSpPr>
-            <p:cNvPr id="16" name="Rectangle 15">
+            <p:cNvPr id="27" name="Rectangle 26">
               <a:extLst>
                 <a:ext uri="{FF2B5EF4-FFF2-40B4-BE49-F238E27FC236}">
-                  <a16:creationId xmlns:a16="http://schemas.microsoft.com/office/drawing/2014/main" id="{9BF2AFBA-061A-4282-B4A9-301B7F594EB5}"/>
+                  <a16:creationId xmlns:a16="http://schemas.microsoft.com/office/drawing/2014/main" id="{841A7A56-3849-4B8E-8BBB-3EFDB88F6B60}"/>
                 </a:ext>
               </a:extLst>
             </p:cNvPr>
@@ -7243,10 +6911,10 @@
         </p:sp>
         <p:pic>
           <p:nvPicPr>
-            <p:cNvPr id="17" name="Picture 16">
+            <p:cNvPr id="28" name="Picture 27">
               <a:extLst>
                 <a:ext uri="{FF2B5EF4-FFF2-40B4-BE49-F238E27FC236}">
-                  <a16:creationId xmlns:a16="http://schemas.microsoft.com/office/drawing/2014/main" id="{3964288A-DDB1-45B5-8C26-2559F7F3A5FF}"/>
+                  <a16:creationId xmlns:a16="http://schemas.microsoft.com/office/drawing/2014/main" id="{6E55BC04-41E0-4E74-83C2-440CDCD811EC}"/>
                 </a:ext>
               </a:extLst>
             </p:cNvPr>
@@ -7256,11 +6924,11 @@
             <p:nvPr/>
           </p:nvPicPr>
           <p:blipFill rotWithShape="1">
-            <a:blip r:embed="rId2">
+            <a:blip r:embed="rId7">
               <a:extLst>
                 <a:ext uri="{BEBA8EAE-BF5A-486C-A8C5-ECC9F3942E4B}">
                   <a14:imgProps xmlns:a14="http://schemas.microsoft.com/office/drawing/2010/main">
-                    <a14:imgLayer r:embed="rId3">
+                    <a14:imgLayer r:embed="rId8">
                       <a14:imgEffect>
                         <a14:artisticPlasticWrap/>
                       </a14:imgEffect>
@@ -7296,10 +6964,10 @@
         </p:pic>
         <p:pic>
           <p:nvPicPr>
-            <p:cNvPr id="18" name="Picture 17">
+            <p:cNvPr id="29" name="Picture 28">
               <a:extLst>
                 <a:ext uri="{FF2B5EF4-FFF2-40B4-BE49-F238E27FC236}">
-                  <a16:creationId xmlns:a16="http://schemas.microsoft.com/office/drawing/2014/main" id="{24A6C095-C502-4DD3-8993-1E4AB18D6BAB}"/>
+                  <a16:creationId xmlns:a16="http://schemas.microsoft.com/office/drawing/2014/main" id="{9618EF74-B000-4651-92C9-1845B5F61964}"/>
                 </a:ext>
               </a:extLst>
             </p:cNvPr>
@@ -7309,11 +6977,11 @@
             <p:nvPr/>
           </p:nvPicPr>
           <p:blipFill rotWithShape="1">
-            <a:blip r:embed="rId2">
+            <a:blip r:embed="rId7">
               <a:extLst>
                 <a:ext uri="{BEBA8EAE-BF5A-486C-A8C5-ECC9F3942E4B}">
                   <a14:imgProps xmlns:a14="http://schemas.microsoft.com/office/drawing/2010/main">
-                    <a14:imgLayer r:embed="rId3">
+                    <a14:imgLayer r:embed="rId8">
                       <a14:imgEffect>
                         <a14:artisticPlasticWrap/>
                       </a14:imgEffect>
@@ -7349,10 +7017,10 @@
         </p:pic>
         <p:pic>
           <p:nvPicPr>
-            <p:cNvPr id="19" name="Picture 18">
+            <p:cNvPr id="31" name="Picture 30">
               <a:extLst>
                 <a:ext uri="{FF2B5EF4-FFF2-40B4-BE49-F238E27FC236}">
-                  <a16:creationId xmlns:a16="http://schemas.microsoft.com/office/drawing/2014/main" id="{5391FD4A-D714-478E-88BE-D6BD71D1EC5F}"/>
+                  <a16:creationId xmlns:a16="http://schemas.microsoft.com/office/drawing/2014/main" id="{A4FE54D6-EEBC-474F-942B-22951E1CAFFB}"/>
                 </a:ext>
               </a:extLst>
             </p:cNvPr>
@@ -7362,11 +7030,11 @@
             <p:nvPr/>
           </p:nvPicPr>
           <p:blipFill rotWithShape="1">
-            <a:blip r:embed="rId2">
+            <a:blip r:embed="rId7">
               <a:extLst>
                 <a:ext uri="{BEBA8EAE-BF5A-486C-A8C5-ECC9F3942E4B}">
                   <a14:imgProps xmlns:a14="http://schemas.microsoft.com/office/drawing/2010/main">
-                    <a14:imgLayer r:embed="rId3">
+                    <a14:imgLayer r:embed="rId8">
                       <a14:imgEffect>
                         <a14:artisticPlasticWrap/>
                       </a14:imgEffect>
@@ -7402,10 +7070,10 @@
         </p:pic>
         <p:pic>
           <p:nvPicPr>
-            <p:cNvPr id="22" name="Picture 21">
+            <p:cNvPr id="32" name="Picture 31">
               <a:extLst>
                 <a:ext uri="{FF2B5EF4-FFF2-40B4-BE49-F238E27FC236}">
-                  <a16:creationId xmlns:a16="http://schemas.microsoft.com/office/drawing/2014/main" id="{9D912A20-FFED-4A5B-8E57-FFB803A79EEB}"/>
+                  <a16:creationId xmlns:a16="http://schemas.microsoft.com/office/drawing/2014/main" id="{40F26A53-AF5F-4B08-AA2D-685A3B72435B}"/>
                 </a:ext>
               </a:extLst>
             </p:cNvPr>
@@ -7415,7 +7083,7 @@
             <p:nvPr/>
           </p:nvPicPr>
           <p:blipFill>
-            <a:blip r:embed="rId4">
+            <a:blip r:embed="rId9">
               <a:clrChange>
                 <a:clrFrom>
                   <a:srgbClr val="FFFFFF"/>
@@ -7448,10 +7116,10 @@
         </p:pic>
         <p:pic>
           <p:nvPicPr>
-            <p:cNvPr id="23" name="Picture 22">
+            <p:cNvPr id="33" name="Picture 32">
               <a:extLst>
                 <a:ext uri="{FF2B5EF4-FFF2-40B4-BE49-F238E27FC236}">
-                  <a16:creationId xmlns:a16="http://schemas.microsoft.com/office/drawing/2014/main" id="{117E62B0-2A2C-46EE-9B4C-693A6D174138}"/>
+                  <a16:creationId xmlns:a16="http://schemas.microsoft.com/office/drawing/2014/main" id="{85739D68-7491-45BF-A91B-82F2946346C0}"/>
                 </a:ext>
               </a:extLst>
             </p:cNvPr>
@@ -7461,7 +7129,7 @@
             <p:nvPr/>
           </p:nvPicPr>
           <p:blipFill>
-            <a:blip r:embed="rId4">
+            <a:blip r:embed="rId9">
               <a:clrChange>
                 <a:clrFrom>
                   <a:srgbClr val="FFFFFF"/>
@@ -7494,10 +7162,10 @@
         </p:pic>
         <p:pic>
           <p:nvPicPr>
-            <p:cNvPr id="24" name="Picture 23">
+            <p:cNvPr id="34" name="Picture 33">
               <a:extLst>
                 <a:ext uri="{FF2B5EF4-FFF2-40B4-BE49-F238E27FC236}">
-                  <a16:creationId xmlns:a16="http://schemas.microsoft.com/office/drawing/2014/main" id="{E0123E36-F814-4EA1-8844-B6C96BF162E3}"/>
+                  <a16:creationId xmlns:a16="http://schemas.microsoft.com/office/drawing/2014/main" id="{9D141D4F-6FCF-4822-ABD7-D328A717A4EB}"/>
                 </a:ext>
               </a:extLst>
             </p:cNvPr>
@@ -7507,7 +7175,7 @@
             <p:nvPr/>
           </p:nvPicPr>
           <p:blipFill>
-            <a:blip r:embed="rId4">
+            <a:blip r:embed="rId9">
               <a:clrChange>
                 <a:clrFrom>
                   <a:srgbClr val="FFFFFF"/>
@@ -7544,7 +7212,7 @@
           <p:cNvPr id="2" name="Group 1">
             <a:extLst>
               <a:ext uri="{FF2B5EF4-FFF2-40B4-BE49-F238E27FC236}">
-                <a16:creationId xmlns:a16="http://schemas.microsoft.com/office/drawing/2014/main" id="{29C9E439-ABA8-4F01-8F50-547365716FFF}"/>
+                <a16:creationId xmlns:a16="http://schemas.microsoft.com/office/drawing/2014/main" id="{CBACC906-B61D-48DE-9242-9CB6467ABD7F}"/>
               </a:ext>
             </a:extLst>
           </p:cNvPr>
@@ -7553,18 +7221,18 @@
         </p:nvGrpSpPr>
         <p:grpSpPr>
           <a:xfrm>
-            <a:off x="219821" y="302135"/>
-            <a:ext cx="4132525" cy="5929179"/>
-            <a:chOff x="219821" y="302135"/>
-            <a:chExt cx="4132525" cy="5929179"/>
+            <a:off x="544944" y="4544291"/>
+            <a:ext cx="5283201" cy="1747338"/>
+            <a:chOff x="544944" y="4544291"/>
+            <a:chExt cx="5283201" cy="1747338"/>
           </a:xfrm>
         </p:grpSpPr>
         <p:sp>
           <p:nvSpPr>
-            <p:cNvPr id="10" name="Rectangle 9">
+            <p:cNvPr id="50" name="Rectangle 49">
               <a:extLst>
                 <a:ext uri="{FF2B5EF4-FFF2-40B4-BE49-F238E27FC236}">
-                  <a16:creationId xmlns:a16="http://schemas.microsoft.com/office/drawing/2014/main" id="{E4AD598C-FFFC-498B-B5A0-671EB1704D14}"/>
+                  <a16:creationId xmlns:a16="http://schemas.microsoft.com/office/drawing/2014/main" id="{0042ED61-7428-4854-A30A-30E680528BFC}"/>
                 </a:ext>
               </a:extLst>
             </p:cNvPr>
@@ -7573,7 +7241,439 @@
           </p:nvSpPr>
           <p:spPr>
             <a:xfrm>
-              <a:off x="219821" y="302135"/>
+              <a:off x="544944" y="4544291"/>
+              <a:ext cx="5283201" cy="1747338"/>
+            </a:xfrm>
+            <a:prstGeom prst="rect">
+              <a:avLst/>
+            </a:prstGeom>
+            <a:solidFill>
+              <a:srgbClr val="FBFBFB"/>
+            </a:solidFill>
+            <a:ln w="177800">
+              <a:solidFill>
+                <a:schemeClr val="tx1"/>
+              </a:solidFill>
+            </a:ln>
+            <a:effectLst>
+              <a:softEdge rad="127000"/>
+            </a:effectLst>
+          </p:spPr>
+          <p:style>
+            <a:lnRef idx="2">
+              <a:schemeClr val="accent1">
+                <a:shade val="50000"/>
+              </a:schemeClr>
+            </a:lnRef>
+            <a:fillRef idx="1">
+              <a:schemeClr val="accent1"/>
+            </a:fillRef>
+            <a:effectRef idx="0">
+              <a:schemeClr val="accent1"/>
+            </a:effectRef>
+            <a:fontRef idx="minor">
+              <a:schemeClr val="lt1"/>
+            </a:fontRef>
+          </p:style>
+          <p:txBody>
+            <a:bodyPr rtlCol="0" anchor="ctr"/>
+            <a:lstStyle/>
+            <a:p>
+              <a:r>
+                <a:rPr lang="en-US" sz="4000" b="1" dirty="0">
+                  <a:solidFill>
+                    <a:schemeClr val="tx1"/>
+                  </a:solidFill>
+                  <a:latin typeface="Algerian" panose="04020705040A02060702" pitchFamily="82" charset="0"/>
+                </a:rPr>
+                <a:t> Fruit</a:t>
+              </a:r>
+            </a:p>
+            <a:p>
+              <a:r>
+                <a:rPr lang="en-US" sz="4000" b="1" dirty="0">
+                  <a:solidFill>
+                    <a:schemeClr val="tx1"/>
+                  </a:solidFill>
+                  <a:latin typeface="Algerian" panose="04020705040A02060702" pitchFamily="82" charset="0"/>
+                </a:rPr>
+                <a:t> Salad</a:t>
+              </a:r>
+            </a:p>
+          </p:txBody>
+        </p:sp>
+        <p:pic>
+          <p:nvPicPr>
+            <p:cNvPr id="35" name="Picture 34">
+              <a:extLst>
+                <a:ext uri="{FF2B5EF4-FFF2-40B4-BE49-F238E27FC236}">
+                  <a16:creationId xmlns:a16="http://schemas.microsoft.com/office/drawing/2014/main" id="{3F1353EB-A217-404F-BE0D-B02984A925B2}"/>
+                </a:ext>
+              </a:extLst>
+            </p:cNvPr>
+            <p:cNvPicPr>
+              <a:picLocks noChangeAspect="1"/>
+            </p:cNvPicPr>
+            <p:nvPr/>
+          </p:nvPicPr>
+          <p:blipFill>
+            <a:blip r:embed="rId9">
+              <a:clrChange>
+                <a:clrFrom>
+                  <a:srgbClr val="FFFFFF"/>
+                </a:clrFrom>
+                <a:clrTo>
+                  <a:srgbClr val="FFFFFF">
+                    <a:alpha val="0"/>
+                  </a:srgbClr>
+                </a:clrTo>
+              </a:clrChange>
+              <a:extLst>
+                <a:ext uri="{28A0092B-C50C-407E-A947-70E740481C1C}">
+                  <a14:useLocalDpi xmlns:a14="http://schemas.microsoft.com/office/drawing/2010/main" val="0"/>
+                </a:ext>
+              </a:extLst>
+            </a:blip>
+            <a:stretch>
+              <a:fillRect/>
+            </a:stretch>
+          </p:blipFill>
+          <p:spPr>
+            <a:xfrm>
+              <a:off x="3548955" y="5122225"/>
+              <a:ext cx="1004202" cy="955300"/>
+            </a:xfrm>
+            <a:prstGeom prst="rect">
+              <a:avLst/>
+            </a:prstGeom>
+            <a:solidFill>
+              <a:srgbClr val="FBFBFB"/>
+            </a:solidFill>
+          </p:spPr>
+        </p:pic>
+        <p:pic>
+          <p:nvPicPr>
+            <p:cNvPr id="36" name="Picture 35">
+              <a:extLst>
+                <a:ext uri="{FF2B5EF4-FFF2-40B4-BE49-F238E27FC236}">
+                  <a16:creationId xmlns:a16="http://schemas.microsoft.com/office/drawing/2014/main" id="{790280C5-3C90-46A7-81CE-542AB49C1C26}"/>
+                </a:ext>
+              </a:extLst>
+            </p:cNvPr>
+            <p:cNvPicPr>
+              <a:picLocks noChangeAspect="1"/>
+            </p:cNvPicPr>
+            <p:nvPr/>
+          </p:nvPicPr>
+          <p:blipFill>
+            <a:blip r:embed="rId9">
+              <a:clrChange>
+                <a:clrFrom>
+                  <a:srgbClr val="FFFFFF"/>
+                </a:clrFrom>
+                <a:clrTo>
+                  <a:srgbClr val="FFFFFF">
+                    <a:alpha val="0"/>
+                  </a:srgbClr>
+                </a:clrTo>
+              </a:clrChange>
+              <a:extLst>
+                <a:ext uri="{28A0092B-C50C-407E-A947-70E740481C1C}">
+                  <a14:useLocalDpi xmlns:a14="http://schemas.microsoft.com/office/drawing/2010/main" val="0"/>
+                </a:ext>
+              </a:extLst>
+            </a:blip>
+            <a:stretch>
+              <a:fillRect/>
+            </a:stretch>
+          </p:blipFill>
+          <p:spPr>
+            <a:xfrm>
+              <a:off x="4582950" y="5109704"/>
+              <a:ext cx="1004202" cy="955300"/>
+            </a:xfrm>
+            <a:prstGeom prst="rect">
+              <a:avLst/>
+            </a:prstGeom>
+            <a:solidFill>
+              <a:srgbClr val="FBFBFB"/>
+            </a:solidFill>
+          </p:spPr>
+        </p:pic>
+        <p:pic>
+          <p:nvPicPr>
+            <p:cNvPr id="37" name="Picture 36">
+              <a:extLst>
+                <a:ext uri="{FF2B5EF4-FFF2-40B4-BE49-F238E27FC236}">
+                  <a16:creationId xmlns:a16="http://schemas.microsoft.com/office/drawing/2014/main" id="{F00AE954-2958-4457-9BEE-82027352EB64}"/>
+                </a:ext>
+              </a:extLst>
+            </p:cNvPr>
+            <p:cNvPicPr>
+              <a:picLocks noChangeAspect="1"/>
+            </p:cNvPicPr>
+            <p:nvPr/>
+          </p:nvPicPr>
+          <p:blipFill>
+            <a:blip r:embed="rId9">
+              <a:clrChange>
+                <a:clrFrom>
+                  <a:srgbClr val="FFFFFF"/>
+                </a:clrFrom>
+                <a:clrTo>
+                  <a:srgbClr val="FFFFFF">
+                    <a:alpha val="0"/>
+                  </a:srgbClr>
+                </a:clrTo>
+              </a:clrChange>
+              <a:extLst>
+                <a:ext uri="{28A0092B-C50C-407E-A947-70E740481C1C}">
+                  <a14:useLocalDpi xmlns:a14="http://schemas.microsoft.com/office/drawing/2010/main" val="0"/>
+                </a:ext>
+              </a:extLst>
+            </a:blip>
+            <a:stretch>
+              <a:fillRect/>
+            </a:stretch>
+          </p:blipFill>
+          <p:spPr>
+            <a:xfrm>
+              <a:off x="2514960" y="5122225"/>
+              <a:ext cx="1004202" cy="955300"/>
+            </a:xfrm>
+            <a:prstGeom prst="rect">
+              <a:avLst/>
+            </a:prstGeom>
+            <a:solidFill>
+              <a:srgbClr val="FBFBFB"/>
+            </a:solidFill>
+          </p:spPr>
+        </p:pic>
+        <p:pic>
+          <p:nvPicPr>
+            <p:cNvPr id="38" name="Picture 37">
+              <a:extLst>
+                <a:ext uri="{FF2B5EF4-FFF2-40B4-BE49-F238E27FC236}">
+                  <a16:creationId xmlns:a16="http://schemas.microsoft.com/office/drawing/2014/main" id="{8FD3C6F3-5675-4500-A256-7B005153B5AD}"/>
+                </a:ext>
+              </a:extLst>
+            </p:cNvPr>
+            <p:cNvPicPr>
+              <a:picLocks noChangeAspect="1"/>
+            </p:cNvPicPr>
+            <p:nvPr/>
+          </p:nvPicPr>
+          <p:blipFill rotWithShape="1">
+            <a:blip r:embed="rId7">
+              <a:extLst>
+                <a:ext uri="{BEBA8EAE-BF5A-486C-A8C5-ECC9F3942E4B}">
+                  <a14:imgProps xmlns:a14="http://schemas.microsoft.com/office/drawing/2010/main">
+                    <a14:imgLayer r:embed="rId8">
+                      <a14:imgEffect>
+                        <a14:artisticPlasticWrap/>
+                      </a14:imgEffect>
+                      <a14:imgEffect>
+                        <a14:colorTemperature colorTemp="11200"/>
+                      </a14:imgEffect>
+                      <a14:imgEffect>
+                        <a14:saturation sat="400000"/>
+                      </a14:imgEffect>
+                      <a14:imgEffect>
+                        <a14:brightnessContrast contrast="40000"/>
+                      </a14:imgEffect>
+                    </a14:imgLayer>
+                  </a14:imgProps>
+                </a:ext>
+                <a:ext uri="{28A0092B-C50C-407E-A947-70E740481C1C}">
+                  <a14:useLocalDpi xmlns:a14="http://schemas.microsoft.com/office/drawing/2010/main" val="0"/>
+                </a:ext>
+              </a:extLst>
+            </a:blip>
+            <a:srcRect l="28919" t="14445" r="31742" b="43757"/>
+            <a:stretch/>
+          </p:blipFill>
+          <p:spPr>
+            <a:xfrm>
+              <a:off x="4191481" y="4581238"/>
+              <a:ext cx="443346" cy="471055"/>
+            </a:xfrm>
+            <a:prstGeom prst="rect">
+              <a:avLst/>
+            </a:prstGeom>
+          </p:spPr>
+        </p:pic>
+        <p:pic>
+          <p:nvPicPr>
+            <p:cNvPr id="39" name="Picture 38">
+              <a:extLst>
+                <a:ext uri="{FF2B5EF4-FFF2-40B4-BE49-F238E27FC236}">
+                  <a16:creationId xmlns:a16="http://schemas.microsoft.com/office/drawing/2014/main" id="{81028FD2-F760-413A-81D4-F5D7294B202A}"/>
+                </a:ext>
+              </a:extLst>
+            </p:cNvPr>
+            <p:cNvPicPr>
+              <a:picLocks noChangeAspect="1"/>
+            </p:cNvPicPr>
+            <p:nvPr/>
+          </p:nvPicPr>
+          <p:blipFill rotWithShape="1">
+            <a:blip r:embed="rId7">
+              <a:extLst>
+                <a:ext uri="{BEBA8EAE-BF5A-486C-A8C5-ECC9F3942E4B}">
+                  <a14:imgProps xmlns:a14="http://schemas.microsoft.com/office/drawing/2010/main">
+                    <a14:imgLayer r:embed="rId8">
+                      <a14:imgEffect>
+                        <a14:artisticPlasticWrap/>
+                      </a14:imgEffect>
+                      <a14:imgEffect>
+                        <a14:colorTemperature colorTemp="11200"/>
+                      </a14:imgEffect>
+                      <a14:imgEffect>
+                        <a14:saturation sat="400000"/>
+                      </a14:imgEffect>
+                      <a14:imgEffect>
+                        <a14:brightnessContrast contrast="40000"/>
+                      </a14:imgEffect>
+                    </a14:imgLayer>
+                  </a14:imgProps>
+                </a:ext>
+                <a:ext uri="{28A0092B-C50C-407E-A947-70E740481C1C}">
+                  <a14:useLocalDpi xmlns:a14="http://schemas.microsoft.com/office/drawing/2010/main" val="0"/>
+                </a:ext>
+              </a:extLst>
+            </a:blip>
+            <a:srcRect l="28919" t="14445" r="31742" b="43757"/>
+            <a:stretch/>
+          </p:blipFill>
+          <p:spPr>
+            <a:xfrm>
+              <a:off x="3748135" y="4594580"/>
+              <a:ext cx="443346" cy="471055"/>
+            </a:xfrm>
+            <a:prstGeom prst="rect">
+              <a:avLst/>
+            </a:prstGeom>
+          </p:spPr>
+        </p:pic>
+        <p:pic>
+          <p:nvPicPr>
+            <p:cNvPr id="42" name="Picture 41">
+              <a:extLst>
+                <a:ext uri="{FF2B5EF4-FFF2-40B4-BE49-F238E27FC236}">
+                  <a16:creationId xmlns:a16="http://schemas.microsoft.com/office/drawing/2014/main" id="{98D44A84-0C2F-4630-AE26-DC936E5BCAF1}"/>
+                </a:ext>
+              </a:extLst>
+            </p:cNvPr>
+            <p:cNvPicPr>
+              <a:picLocks noChangeAspect="1"/>
+            </p:cNvPicPr>
+            <p:nvPr/>
+          </p:nvPicPr>
+          <p:blipFill rotWithShape="1">
+            <a:blip r:embed="rId7">
+              <a:extLst>
+                <a:ext uri="{BEBA8EAE-BF5A-486C-A8C5-ECC9F3942E4B}">
+                  <a14:imgProps xmlns:a14="http://schemas.microsoft.com/office/drawing/2010/main">
+                    <a14:imgLayer r:embed="rId8">
+                      <a14:imgEffect>
+                        <a14:artisticPlasticWrap/>
+                      </a14:imgEffect>
+                      <a14:imgEffect>
+                        <a14:colorTemperature colorTemp="11200"/>
+                      </a14:imgEffect>
+                      <a14:imgEffect>
+                        <a14:saturation sat="400000"/>
+                      </a14:imgEffect>
+                      <a14:imgEffect>
+                        <a14:brightnessContrast contrast="40000"/>
+                      </a14:imgEffect>
+                    </a14:imgLayer>
+                  </a14:imgProps>
+                </a:ext>
+                <a:ext uri="{28A0092B-C50C-407E-A947-70E740481C1C}">
+                  <a14:useLocalDpi xmlns:a14="http://schemas.microsoft.com/office/drawing/2010/main" val="0"/>
+                </a:ext>
+              </a:extLst>
+            </a:blip>
+            <a:srcRect l="28919" t="14445" r="31742" b="43757"/>
+            <a:stretch/>
+          </p:blipFill>
+          <p:spPr>
+            <a:xfrm>
+              <a:off x="3304789" y="4581237"/>
+              <a:ext cx="443346" cy="471055"/>
+            </a:xfrm>
+            <a:prstGeom prst="rect">
+              <a:avLst/>
+            </a:prstGeom>
+          </p:spPr>
+        </p:pic>
+      </p:grpSp>
+    </p:spTree>
+    <p:extLst>
+      <p:ext uri="{BB962C8B-B14F-4D97-AF65-F5344CB8AC3E}">
+        <p14:creationId xmlns:p14="http://schemas.microsoft.com/office/powerpoint/2010/main" val="4046896049"/>
+      </p:ext>
+    </p:extLst>
+  </p:cSld>
+  <p:clrMapOvr>
+    <a:masterClrMapping/>
+  </p:clrMapOvr>
+</p:sld>
+</file>
+
+<file path=ppt/slides/slide13.xml><?xml version="1.0" encoding="utf-8"?>
+<p:sld xmlns:a="http://schemas.openxmlformats.org/drawingml/2006/main" xmlns:r="http://schemas.openxmlformats.org/officeDocument/2006/relationships" xmlns:p="http://schemas.openxmlformats.org/presentationml/2006/main">
+  <p:cSld>
+    <p:spTree>
+      <p:nvGrpSpPr>
+        <p:cNvPr id="1" name=""/>
+        <p:cNvGrpSpPr/>
+        <p:nvPr/>
+      </p:nvGrpSpPr>
+      <p:grpSpPr>
+        <a:xfrm>
+          <a:off x="0" y="0"/>
+          <a:ext cx="0" cy="0"/>
+          <a:chOff x="0" y="0"/>
+          <a:chExt cx="0" cy="0"/>
+        </a:xfrm>
+      </p:grpSpPr>
+      <p:grpSp>
+        <p:nvGrpSpPr>
+          <p:cNvPr id="22" name="Group 21">
+            <a:extLst>
+              <a:ext uri="{FF2B5EF4-FFF2-40B4-BE49-F238E27FC236}">
+                <a16:creationId xmlns:a16="http://schemas.microsoft.com/office/drawing/2014/main" id="{1B88C679-540C-4DCA-9CF3-FE5C01EFA492}"/>
+              </a:ext>
+            </a:extLst>
+          </p:cNvPr>
+          <p:cNvGrpSpPr/>
+          <p:nvPr/>
+        </p:nvGrpSpPr>
+        <p:grpSpPr>
+          <a:xfrm>
+            <a:off x="6262403" y="226720"/>
+            <a:ext cx="4132525" cy="5929179"/>
+            <a:chOff x="6262403" y="226720"/>
+            <a:chExt cx="4132525" cy="5929179"/>
+          </a:xfrm>
+        </p:grpSpPr>
+        <p:sp>
+          <p:nvSpPr>
+            <p:cNvPr id="14" name="Rectangle 13">
+              <a:extLst>
+                <a:ext uri="{FF2B5EF4-FFF2-40B4-BE49-F238E27FC236}">
+                  <a16:creationId xmlns:a16="http://schemas.microsoft.com/office/drawing/2014/main" id="{E4F3CBF1-DF25-41D7-98C5-84B87917ACD0}"/>
+                </a:ext>
+              </a:extLst>
+            </p:cNvPr>
+            <p:cNvSpPr/>
+            <p:nvPr/>
+          </p:nvSpPr>
+          <p:spPr>
+            <a:xfrm>
+              <a:off x="6262403" y="226720"/>
               <a:ext cx="4132525" cy="5929179"/>
             </a:xfrm>
             <a:prstGeom prst="rect">
@@ -7618,79 +7718,6 @@
                   <a:spcPct val="200000"/>
                 </a:lnSpc>
               </a:pPr>
-              <a:r>
-                <a:rPr lang="en-US" sz="4000" b="1" dirty="0">
-                  <a:solidFill>
-                    <a:schemeClr val="tx1"/>
-                  </a:solidFill>
-                  <a:latin typeface="Algerian" panose="04020705040A02060702" pitchFamily="82" charset="0"/>
-                </a:rPr>
-                <a:t>Caesar salad:</a:t>
-              </a:r>
-              <a:endParaRPr lang="en-US" sz="4000" dirty="0">
-                <a:solidFill>
-                  <a:schemeClr val="tx1"/>
-                </a:solidFill>
-                <a:latin typeface="Algerian" panose="04020705040A02060702" pitchFamily="82" charset="0"/>
-              </a:endParaRPr>
-            </a:p>
-            <a:p>
-              <a:pPr algn="ctr">
-                <a:lnSpc>
-                  <a:spcPct val="200000"/>
-                </a:lnSpc>
-                <a:buSzPct val="150000"/>
-              </a:pPr>
-              <a:r>
-                <a:rPr lang="en-US" sz="4000" dirty="0">
-                  <a:solidFill>
-                    <a:schemeClr val="tx1"/>
-                  </a:solidFill>
-                  <a:latin typeface="Algerian" panose="04020705040A02060702" pitchFamily="82" charset="0"/>
-                </a:rPr>
-                <a:t>    meat</a:t>
-              </a:r>
-            </a:p>
-            <a:p>
-              <a:pPr algn="ctr">
-                <a:lnSpc>
-                  <a:spcPct val="200000"/>
-                </a:lnSpc>
-                <a:buSzPct val="150000"/>
-              </a:pPr>
-              <a:r>
-                <a:rPr lang="en-US" sz="4000" dirty="0">
-                  <a:solidFill>
-                    <a:schemeClr val="tx1"/>
-                  </a:solidFill>
-                  <a:latin typeface="Algerian" panose="04020705040A02060702" pitchFamily="82" charset="0"/>
-                </a:rPr>
-                <a:t>        fruit/veg</a:t>
-              </a:r>
-            </a:p>
-            <a:p>
-              <a:pPr algn="ctr">
-                <a:lnSpc>
-                  <a:spcPct val="200000"/>
-                </a:lnSpc>
-                <a:buSzPct val="150000"/>
-              </a:pPr>
-              <a:r>
-                <a:rPr lang="en-US" sz="4000" dirty="0">
-                  <a:solidFill>
-                    <a:schemeClr val="tx1"/>
-                  </a:solidFill>
-                  <a:latin typeface="Algerian" panose="04020705040A02060702" pitchFamily="82" charset="0"/>
-                </a:rPr>
-                <a:t>         fruit/veg</a:t>
-              </a:r>
-            </a:p>
-            <a:p>
-              <a:pPr algn="ctr">
-                <a:lnSpc>
-                  <a:spcPct val="200000"/>
-                </a:lnSpc>
-              </a:pPr>
               <a:endParaRPr lang="en-US" sz="4800" dirty="0">
                 <a:solidFill>
                   <a:schemeClr val="tx1"/>
@@ -7702,63 +7729,10 @@
         </p:sp>
         <p:pic>
           <p:nvPicPr>
-            <p:cNvPr id="12" name="Picture 11">
+            <p:cNvPr id="21" name="Picture 20">
               <a:extLst>
                 <a:ext uri="{FF2B5EF4-FFF2-40B4-BE49-F238E27FC236}">
-                  <a16:creationId xmlns:a16="http://schemas.microsoft.com/office/drawing/2014/main" id="{2FE1249F-AB7C-4A4E-8493-765182617B04}"/>
-                </a:ext>
-              </a:extLst>
-            </p:cNvPr>
-            <p:cNvPicPr>
-              <a:picLocks noChangeAspect="1"/>
-            </p:cNvPicPr>
-            <p:nvPr/>
-          </p:nvPicPr>
-          <p:blipFill rotWithShape="1">
-            <a:blip r:embed="rId2">
-              <a:extLst>
-                <a:ext uri="{BEBA8EAE-BF5A-486C-A8C5-ECC9F3942E4B}">
-                  <a14:imgProps xmlns:a14="http://schemas.microsoft.com/office/drawing/2010/main">
-                    <a14:imgLayer r:embed="rId3">
-                      <a14:imgEffect>
-                        <a14:artisticPlasticWrap/>
-                      </a14:imgEffect>
-                      <a14:imgEffect>
-                        <a14:colorTemperature colorTemp="11200"/>
-                      </a14:imgEffect>
-                      <a14:imgEffect>
-                        <a14:saturation sat="400000"/>
-                      </a14:imgEffect>
-                      <a14:imgEffect>
-                        <a14:brightnessContrast contrast="40000"/>
-                      </a14:imgEffect>
-                    </a14:imgLayer>
-                  </a14:imgProps>
-                </a:ext>
-                <a:ext uri="{28A0092B-C50C-407E-A947-70E740481C1C}">
-                  <a14:useLocalDpi xmlns:a14="http://schemas.microsoft.com/office/drawing/2010/main" val="0"/>
-                </a:ext>
-              </a:extLst>
-            </a:blip>
-            <a:srcRect l="28919" t="14445" r="31742" b="43757"/>
-            <a:stretch/>
-          </p:blipFill>
-          <p:spPr>
-            <a:xfrm>
-              <a:off x="2296613" y="5577430"/>
-              <a:ext cx="443346" cy="471055"/>
-            </a:xfrm>
-            <a:prstGeom prst="rect">
-              <a:avLst/>
-            </a:prstGeom>
-          </p:spPr>
-        </p:pic>
-        <p:pic>
-          <p:nvPicPr>
-            <p:cNvPr id="15" name="Picture 14">
-              <a:extLst>
-                <a:ext uri="{FF2B5EF4-FFF2-40B4-BE49-F238E27FC236}">
-                  <a16:creationId xmlns:a16="http://schemas.microsoft.com/office/drawing/2014/main" id="{271E8977-1EA4-439B-BEA6-114566CF786D}"/>
+                  <a16:creationId xmlns:a16="http://schemas.microsoft.com/office/drawing/2014/main" id="{94DCFA0F-51ED-4A3A-8B67-558A4269AB01}"/>
                 </a:ext>
               </a:extLst>
             </p:cNvPr>
@@ -7768,17 +7742,15 @@
             <p:nvPr/>
           </p:nvPicPr>
           <p:blipFill>
-            <a:blip r:embed="rId5">
-              <a:extLst>
-                <a:ext uri="{BEBA8EAE-BF5A-486C-A8C5-ECC9F3942E4B}">
-                  <a14:imgProps xmlns:a14="http://schemas.microsoft.com/office/drawing/2010/main">
-                    <a14:imgLayer r:embed="rId6">
-                      <a14:imgEffect>
-                        <a14:brightnessContrast contrast="40000"/>
-                      </a14:imgEffect>
-                    </a14:imgLayer>
-                  </a14:imgProps>
-                </a:ext>
+            <a:blip r:embed="rId2">
+              <a:duotone>
+                <a:prstClr val="black"/>
+                <a:srgbClr val="D9C3A5">
+                  <a:tint val="50000"/>
+                  <a:satMod val="180000"/>
+                </a:srgbClr>
+              </a:duotone>
+              <a:extLst>
                 <a:ext uri="{28A0092B-C50C-407E-A947-70E740481C1C}">
                   <a14:useLocalDpi xmlns:a14="http://schemas.microsoft.com/office/drawing/2010/main" val="0"/>
                 </a:ext>
@@ -7790,153 +7762,8 @@
           </p:blipFill>
           <p:spPr>
             <a:xfrm>
-              <a:off x="299531" y="1572963"/>
-              <a:ext cx="1354797" cy="1354797"/>
-            </a:xfrm>
-            <a:prstGeom prst="rect">
-              <a:avLst/>
-            </a:prstGeom>
-          </p:spPr>
-        </p:pic>
-        <p:pic>
-          <p:nvPicPr>
-            <p:cNvPr id="25" name="Picture 24">
-              <a:extLst>
-                <a:ext uri="{FF2B5EF4-FFF2-40B4-BE49-F238E27FC236}">
-                  <a16:creationId xmlns:a16="http://schemas.microsoft.com/office/drawing/2014/main" id="{71A1817F-A074-4CD3-8149-C27FE1348473}"/>
-                </a:ext>
-              </a:extLst>
-            </p:cNvPr>
-            <p:cNvPicPr>
-              <a:picLocks noChangeAspect="1"/>
-            </p:cNvPicPr>
-            <p:nvPr/>
-          </p:nvPicPr>
-          <p:blipFill>
-            <a:blip r:embed="rId4">
-              <a:clrChange>
-                <a:clrFrom>
-                  <a:srgbClr val="FFFFFF"/>
-                </a:clrFrom>
-                <a:clrTo>
-                  <a:srgbClr val="FFFFFF">
-                    <a:alpha val="0"/>
-                  </a:srgbClr>
-                </a:clrTo>
-              </a:clrChange>
-              <a:extLst>
-                <a:ext uri="{28A0092B-C50C-407E-A947-70E740481C1C}">
-                  <a14:useLocalDpi xmlns:a14="http://schemas.microsoft.com/office/drawing/2010/main" val="0"/>
-                </a:ext>
-              </a:extLst>
-            </a:blip>
-            <a:stretch>
-              <a:fillRect/>
-            </a:stretch>
-          </p:blipFill>
-          <p:spPr>
-            <a:xfrm>
-              <a:off x="580315" y="2979727"/>
-              <a:ext cx="782965" cy="898545"/>
-            </a:xfrm>
-            <a:prstGeom prst="rect">
-              <a:avLst/>
-            </a:prstGeom>
-          </p:spPr>
-        </p:pic>
-        <p:pic>
-          <p:nvPicPr>
-            <p:cNvPr id="26" name="Picture 25">
-              <a:extLst>
-                <a:ext uri="{FF2B5EF4-FFF2-40B4-BE49-F238E27FC236}">
-                  <a16:creationId xmlns:a16="http://schemas.microsoft.com/office/drawing/2014/main" id="{8C45E397-1AA0-45D4-8B54-2B8F51A8D01B}"/>
-                </a:ext>
-              </a:extLst>
-            </p:cNvPr>
-            <p:cNvPicPr>
-              <a:picLocks noChangeAspect="1"/>
-            </p:cNvPicPr>
-            <p:nvPr/>
-          </p:nvPicPr>
-          <p:blipFill>
-            <a:blip r:embed="rId4">
-              <a:clrChange>
-                <a:clrFrom>
-                  <a:srgbClr val="FFFFFF"/>
-                </a:clrFrom>
-                <a:clrTo>
-                  <a:srgbClr val="FFFFFF">
-                    <a:alpha val="0"/>
-                  </a:srgbClr>
-                </a:clrTo>
-              </a:clrChange>
-              <a:extLst>
-                <a:ext uri="{28A0092B-C50C-407E-A947-70E740481C1C}">
-                  <a14:useLocalDpi xmlns:a14="http://schemas.microsoft.com/office/drawing/2010/main" val="0"/>
-                </a:ext>
-              </a:extLst>
-            </a:blip>
-            <a:stretch>
-              <a:fillRect/>
-            </a:stretch>
-          </p:blipFill>
-          <p:spPr>
-            <a:xfrm>
-              <a:off x="580315" y="4263529"/>
-              <a:ext cx="782965" cy="898545"/>
-            </a:xfrm>
-            <a:prstGeom prst="rect">
-              <a:avLst/>
-            </a:prstGeom>
-          </p:spPr>
-        </p:pic>
-        <p:pic>
-          <p:nvPicPr>
-            <p:cNvPr id="20" name="Picture 19">
-              <a:extLst>
-                <a:ext uri="{FF2B5EF4-FFF2-40B4-BE49-F238E27FC236}">
-                  <a16:creationId xmlns:a16="http://schemas.microsoft.com/office/drawing/2014/main" id="{69C070C4-6D8D-4BFA-81B6-DBB1042E979C}"/>
-                </a:ext>
-              </a:extLst>
-            </p:cNvPr>
-            <p:cNvPicPr>
-              <a:picLocks noChangeAspect="1"/>
-            </p:cNvPicPr>
-            <p:nvPr/>
-          </p:nvPicPr>
-          <p:blipFill rotWithShape="1">
-            <a:blip r:embed="rId2">
-              <a:extLst>
-                <a:ext uri="{BEBA8EAE-BF5A-486C-A8C5-ECC9F3942E4B}">
-                  <a14:imgProps xmlns:a14="http://schemas.microsoft.com/office/drawing/2010/main">
-                    <a14:imgLayer r:embed="rId3">
-                      <a14:imgEffect>
-                        <a14:artisticPlasticWrap/>
-                      </a14:imgEffect>
-                      <a14:imgEffect>
-                        <a14:colorTemperature colorTemp="11200"/>
-                      </a14:imgEffect>
-                      <a14:imgEffect>
-                        <a14:saturation sat="400000"/>
-                      </a14:imgEffect>
-                      <a14:imgEffect>
-                        <a14:brightnessContrast contrast="40000"/>
-                      </a14:imgEffect>
-                    </a14:imgLayer>
-                  </a14:imgProps>
-                </a:ext>
-                <a:ext uri="{28A0092B-C50C-407E-A947-70E740481C1C}">
-                  <a14:useLocalDpi xmlns:a14="http://schemas.microsoft.com/office/drawing/2010/main" val="0"/>
-                </a:ext>
-              </a:extLst>
-            </a:blip>
-            <a:srcRect l="28919" t="14445" r="31742" b="43757"/>
-            <a:stretch/>
-          </p:blipFill>
-          <p:spPr>
-            <a:xfrm>
-              <a:off x="1853267" y="5577429"/>
-              <a:ext cx="443346" cy="471055"/>
+              <a:off x="6517385" y="1380029"/>
+              <a:ext cx="3622559" cy="3622559"/>
             </a:xfrm>
             <a:prstGeom prst="rect">
               <a:avLst/>
@@ -7947,7 +7774,7 @@
     </p:spTree>
     <p:extLst>
       <p:ext uri="{BB962C8B-B14F-4D97-AF65-F5344CB8AC3E}">
-        <p14:creationId xmlns:p14="http://schemas.microsoft.com/office/powerpoint/2010/main" val="3786891178"/>
+        <p14:creationId xmlns:p14="http://schemas.microsoft.com/office/powerpoint/2010/main" val="1961273452"/>
       </p:ext>
     </p:extLst>
   </p:cSld>
@@ -7957,7 +7784,114 @@
 </p:sld>
 </file>
 
-<file path=ppt/slides/slide3.xml><?xml version="1.0" encoding="utf-8"?>
+<file path=ppt/slides/slide14.xml><?xml version="1.0" encoding="utf-8"?>
+<p:sld xmlns:a="http://schemas.openxmlformats.org/drawingml/2006/main" xmlns:r="http://schemas.openxmlformats.org/officeDocument/2006/relationships" xmlns:p="http://schemas.openxmlformats.org/presentationml/2006/main">
+  <p:cSld>
+    <p:spTree>
+      <p:nvGrpSpPr>
+        <p:cNvPr id="1" name=""/>
+        <p:cNvGrpSpPr/>
+        <p:nvPr/>
+      </p:nvGrpSpPr>
+      <p:grpSpPr>
+        <a:xfrm>
+          <a:off x="0" y="0"/>
+          <a:ext cx="0" cy="0"/>
+          <a:chOff x="0" y="0"/>
+          <a:chExt cx="0" cy="0"/>
+        </a:xfrm>
+      </p:grpSpPr>
+      <p:sp>
+        <p:nvSpPr>
+          <p:cNvPr id="4" name="Rectangle 3">
+            <a:extLst>
+              <a:ext uri="{FF2B5EF4-FFF2-40B4-BE49-F238E27FC236}">
+                <a16:creationId xmlns:a16="http://schemas.microsoft.com/office/drawing/2014/main" id="{293D4C19-2EE1-47FF-9F79-52A2E84E6C7D}"/>
+              </a:ext>
+            </a:extLst>
+          </p:cNvPr>
+          <p:cNvSpPr/>
+          <p:nvPr/>
+        </p:nvSpPr>
+        <p:spPr>
+          <a:xfrm>
+            <a:off x="678730" y="414779"/>
+            <a:ext cx="10963373" cy="6052009"/>
+          </a:xfrm>
+          <a:prstGeom prst="rect">
+            <a:avLst/>
+          </a:prstGeom>
+          <a:gradFill flip="none" rotWithShape="1">
+            <a:gsLst>
+              <a:gs pos="0">
+                <a:schemeClr val="accent6">
+                  <a:lumMod val="89000"/>
+                </a:schemeClr>
+              </a:gs>
+              <a:gs pos="14000">
+                <a:schemeClr val="accent6">
+                  <a:lumMod val="89000"/>
+                </a:schemeClr>
+              </a:gs>
+              <a:gs pos="46000">
+                <a:schemeClr val="accent6">
+                  <a:lumMod val="75000"/>
+                </a:schemeClr>
+              </a:gs>
+              <a:gs pos="75000">
+                <a:schemeClr val="accent6">
+                  <a:lumMod val="70000"/>
+                </a:schemeClr>
+              </a:gs>
+            </a:gsLst>
+            <a:path path="circle">
+              <a:fillToRect l="50000" t="50000" r="50000" b="50000"/>
+            </a:path>
+            <a:tileRect/>
+          </a:gradFill>
+          <a:ln>
+            <a:noFill/>
+          </a:ln>
+        </p:spPr>
+        <p:style>
+          <a:lnRef idx="2">
+            <a:schemeClr val="accent1">
+              <a:shade val="50000"/>
+            </a:schemeClr>
+          </a:lnRef>
+          <a:fillRef idx="1">
+            <a:schemeClr val="accent1"/>
+          </a:fillRef>
+          <a:effectRef idx="0">
+            <a:schemeClr val="accent1"/>
+          </a:effectRef>
+          <a:fontRef idx="minor">
+            <a:schemeClr val="lt1"/>
+          </a:fontRef>
+        </p:style>
+        <p:txBody>
+          <a:bodyPr rtlCol="0" anchor="ctr"/>
+          <a:lstStyle/>
+          <a:p>
+            <a:pPr algn="ctr"/>
+            <a:endParaRPr lang="en-US"/>
+          </a:p>
+        </p:txBody>
+      </p:sp>
+    </p:spTree>
+    <p:extLst>
+      <p:ext uri="{BB962C8B-B14F-4D97-AF65-F5344CB8AC3E}">
+        <p14:creationId xmlns:p14="http://schemas.microsoft.com/office/powerpoint/2010/main" val="91903463"/>
+      </p:ext>
+    </p:extLst>
+  </p:cSld>
+  <p:clrMapOvr>
+    <a:masterClrMapping/>
+  </p:clrMapOvr>
+</p:sld>
+</file>
+
+<file path=ppt/slides/slide2.xml><?xml version="1.0" encoding="utf-8"?>
 <p:sld xmlns:a="http://schemas.openxmlformats.org/drawingml/2006/main" xmlns:r="http://schemas.openxmlformats.org/officeDocument/2006/relationships" xmlns:p="http://schemas.openxmlformats.org/presentationml/2006/main">
   <p:cSld>
     <p:spTree>
@@ -8837,7 +8771,7 @@
 </p:sld>
 </file>
 
-<file path=ppt/slides/slide4.xml><?xml version="1.0" encoding="utf-8"?>
+<file path=ppt/slides/slide3.xml><?xml version="1.0" encoding="utf-8"?>
 <p:sld xmlns:a="http://schemas.openxmlformats.org/drawingml/2006/main" xmlns:r="http://schemas.openxmlformats.org/officeDocument/2006/relationships" xmlns:p="http://schemas.openxmlformats.org/presentationml/2006/main">
   <p:cSld>
     <p:spTree>
@@ -9649,7 +9583,7 @@
 </p:sld>
 </file>
 
-<file path=ppt/slides/slide5.xml><?xml version="1.0" encoding="utf-8"?>
+<file path=ppt/slides/slide4.xml><?xml version="1.0" encoding="utf-8"?>
 <p:sld xmlns:a="http://schemas.openxmlformats.org/drawingml/2006/main" xmlns:r="http://schemas.openxmlformats.org/officeDocument/2006/relationships" xmlns:p="http://schemas.openxmlformats.org/presentationml/2006/main">
   <p:cSld>
     <p:spTree>
@@ -10520,7 +10454,7 @@
 </p:sld>
 </file>
 
-<file path=ppt/slides/slide6.xml><?xml version="1.0" encoding="utf-8"?>
+<file path=ppt/slides/slide5.xml><?xml version="1.0" encoding="utf-8"?>
 <p:sld xmlns:a="http://schemas.openxmlformats.org/drawingml/2006/main" xmlns:r="http://schemas.openxmlformats.org/officeDocument/2006/relationships" xmlns:p="http://schemas.openxmlformats.org/presentationml/2006/main">
   <p:cSld>
     <p:spTree>
@@ -11375,7 +11309,7 @@
 </p:sld>
 </file>
 
-<file path=ppt/slides/slide7.xml><?xml version="1.0" encoding="utf-8"?>
+<file path=ppt/slides/slide6.xml><?xml version="1.0" encoding="utf-8"?>
 <p:sld xmlns:a="http://schemas.openxmlformats.org/drawingml/2006/main" xmlns:r="http://schemas.openxmlformats.org/officeDocument/2006/relationships" xmlns:p="http://schemas.openxmlformats.org/presentationml/2006/main">
   <p:cSld>
     <p:spTree>
@@ -12313,7 +12247,7 @@
 </p:sld>
 </file>
 
-<file path=ppt/slides/slide8.xml><?xml version="1.0" encoding="utf-8"?>
+<file path=ppt/slides/slide7.xml><?xml version="1.0" encoding="utf-8"?>
 <p:sld xmlns:a="http://schemas.openxmlformats.org/drawingml/2006/main" xmlns:r="http://schemas.openxmlformats.org/officeDocument/2006/relationships" xmlns:p="http://schemas.openxmlformats.org/presentationml/2006/main">
   <p:cSld>
     <p:spTree>
@@ -13133,7 +13067,7 @@
 </p:sld>
 </file>
 
-<file path=ppt/slides/slide9.xml><?xml version="1.0" encoding="utf-8"?>
+<file path=ppt/slides/slide8.xml><?xml version="1.0" encoding="utf-8"?>
 <p:sld xmlns:a="http://schemas.openxmlformats.org/drawingml/2006/main" xmlns:r="http://schemas.openxmlformats.org/officeDocument/2006/relationships" xmlns:p="http://schemas.openxmlformats.org/presentationml/2006/main">
   <p:cSld>
     <p:spTree>
@@ -13953,6 +13887,826 @@
 </p:sld>
 </file>
 
+<file path=ppt/slides/slide9.xml><?xml version="1.0" encoding="utf-8"?>
+<p:sld xmlns:a="http://schemas.openxmlformats.org/drawingml/2006/main" xmlns:r="http://schemas.openxmlformats.org/officeDocument/2006/relationships" xmlns:p="http://schemas.openxmlformats.org/presentationml/2006/main">
+  <p:cSld>
+    <p:spTree>
+      <p:nvGrpSpPr>
+        <p:cNvPr id="1" name=""/>
+        <p:cNvGrpSpPr/>
+        <p:nvPr/>
+      </p:nvGrpSpPr>
+      <p:grpSpPr>
+        <a:xfrm>
+          <a:off x="0" y="0"/>
+          <a:ext cx="0" cy="0"/>
+          <a:chOff x="0" y="0"/>
+          <a:chExt cx="0" cy="0"/>
+        </a:xfrm>
+      </p:grpSpPr>
+      <p:grpSp>
+        <p:nvGrpSpPr>
+          <p:cNvPr id="8" name="Group 7">
+            <a:extLst>
+              <a:ext uri="{FF2B5EF4-FFF2-40B4-BE49-F238E27FC236}">
+                <a16:creationId xmlns:a16="http://schemas.microsoft.com/office/drawing/2014/main" id="{865459E4-828E-498C-8217-DF87F4234815}"/>
+              </a:ext>
+            </a:extLst>
+          </p:cNvPr>
+          <p:cNvGrpSpPr/>
+          <p:nvPr/>
+        </p:nvGrpSpPr>
+        <p:grpSpPr>
+          <a:xfrm>
+            <a:off x="219821" y="302135"/>
+            <a:ext cx="4132525" cy="5929179"/>
+            <a:chOff x="219821" y="302135"/>
+            <a:chExt cx="4132525" cy="5929179"/>
+          </a:xfrm>
+        </p:grpSpPr>
+        <p:grpSp>
+          <p:nvGrpSpPr>
+            <p:cNvPr id="2" name="Group 1">
+              <a:extLst>
+                <a:ext uri="{FF2B5EF4-FFF2-40B4-BE49-F238E27FC236}">
+                  <a16:creationId xmlns:a16="http://schemas.microsoft.com/office/drawing/2014/main" id="{D29A4326-F822-49EC-8D7F-47B44A36FE49}"/>
+                </a:ext>
+              </a:extLst>
+            </p:cNvPr>
+            <p:cNvGrpSpPr/>
+            <p:nvPr/>
+          </p:nvGrpSpPr>
+          <p:grpSpPr>
+            <a:xfrm>
+              <a:off x="219821" y="302135"/>
+              <a:ext cx="4132525" cy="5929179"/>
+              <a:chOff x="219821" y="302135"/>
+              <a:chExt cx="4132525" cy="5929179"/>
+            </a:xfrm>
+          </p:grpSpPr>
+          <p:sp>
+            <p:nvSpPr>
+              <p:cNvPr id="10" name="Rectangle 9">
+                <a:extLst>
+                  <a:ext uri="{FF2B5EF4-FFF2-40B4-BE49-F238E27FC236}">
+                    <a16:creationId xmlns:a16="http://schemas.microsoft.com/office/drawing/2014/main" id="{E4AD598C-FFFC-498B-B5A0-671EB1704D14}"/>
+                  </a:ext>
+                </a:extLst>
+              </p:cNvPr>
+              <p:cNvSpPr/>
+              <p:nvPr/>
+            </p:nvSpPr>
+            <p:spPr>
+              <a:xfrm>
+                <a:off x="219821" y="302135"/>
+                <a:ext cx="4132525" cy="5929179"/>
+              </a:xfrm>
+              <a:prstGeom prst="rect">
+                <a:avLst/>
+              </a:prstGeom>
+              <a:solidFill>
+                <a:schemeClr val="bg1">
+                  <a:lumMod val="95000"/>
+                </a:schemeClr>
+              </a:solidFill>
+              <a:ln w="177800">
+                <a:solidFill>
+                  <a:schemeClr val="tx1"/>
+                </a:solidFill>
+              </a:ln>
+              <a:effectLst>
+                <a:softEdge rad="127000"/>
+              </a:effectLst>
+            </p:spPr>
+            <p:style>
+              <a:lnRef idx="2">
+                <a:schemeClr val="accent1">
+                  <a:shade val="50000"/>
+                </a:schemeClr>
+              </a:lnRef>
+              <a:fillRef idx="1">
+                <a:schemeClr val="accent1"/>
+              </a:fillRef>
+              <a:effectRef idx="0">
+                <a:schemeClr val="accent1"/>
+              </a:effectRef>
+              <a:fontRef idx="minor">
+                <a:schemeClr val="lt1"/>
+              </a:fontRef>
+            </p:style>
+            <p:txBody>
+              <a:bodyPr rtlCol="0" anchor="t"/>
+              <a:lstStyle/>
+              <a:p>
+                <a:pPr algn="ctr">
+                  <a:lnSpc>
+                    <a:spcPct val="200000"/>
+                  </a:lnSpc>
+                </a:pPr>
+                <a:r>
+                  <a:rPr lang="en-US" sz="4000" b="1" dirty="0">
+                    <a:solidFill>
+                      <a:schemeClr val="tx1"/>
+                    </a:solidFill>
+                    <a:latin typeface="Algerian" panose="04020705040A02060702" pitchFamily="82" charset="0"/>
+                  </a:rPr>
+                  <a:t>Beef nigiri:</a:t>
+                </a:r>
+                <a:endParaRPr lang="en-US" sz="4000" dirty="0">
+                  <a:solidFill>
+                    <a:schemeClr val="tx1"/>
+                  </a:solidFill>
+                  <a:latin typeface="Algerian" panose="04020705040A02060702" pitchFamily="82" charset="0"/>
+                </a:endParaRPr>
+              </a:p>
+              <a:p>
+                <a:pPr algn="ctr">
+                  <a:lnSpc>
+                    <a:spcPct val="200000"/>
+                  </a:lnSpc>
+                  <a:buSzPct val="150000"/>
+                </a:pPr>
+                <a:r>
+                  <a:rPr lang="en-US" sz="4000" dirty="0">
+                    <a:solidFill>
+                      <a:schemeClr val="tx1"/>
+                    </a:solidFill>
+                    <a:latin typeface="Algerian" panose="04020705040A02060702" pitchFamily="82" charset="0"/>
+                  </a:rPr>
+                  <a:t> meat</a:t>
+                </a:r>
+              </a:p>
+              <a:p>
+                <a:pPr algn="ctr">
+                  <a:lnSpc>
+                    <a:spcPct val="200000"/>
+                  </a:lnSpc>
+                  <a:buSzPct val="150000"/>
+                </a:pPr>
+                <a:r>
+                  <a:rPr lang="en-US" sz="4000" dirty="0">
+                    <a:solidFill>
+                      <a:schemeClr val="tx1"/>
+                    </a:solidFill>
+                    <a:latin typeface="Algerian" panose="04020705040A02060702" pitchFamily="82" charset="0"/>
+                  </a:rPr>
+                  <a:t>          fruit/veg</a:t>
+                </a:r>
+              </a:p>
+              <a:p>
+                <a:pPr algn="ctr">
+                  <a:lnSpc>
+                    <a:spcPct val="200000"/>
+                  </a:lnSpc>
+                  <a:buSzPct val="150000"/>
+                </a:pPr>
+                <a:r>
+                  <a:rPr lang="en-US" sz="4000" dirty="0">
+                    <a:solidFill>
+                      <a:schemeClr val="tx1"/>
+                    </a:solidFill>
+                    <a:latin typeface="Algerian" panose="04020705040A02060702" pitchFamily="82" charset="0"/>
+                  </a:rPr>
+                  <a:t>  grain</a:t>
+                </a:r>
+                <a:endParaRPr lang="en-US" sz="4800" dirty="0">
+                  <a:solidFill>
+                    <a:schemeClr val="tx1"/>
+                  </a:solidFill>
+                  <a:latin typeface="Algerian" panose="04020705040A02060702" pitchFamily="82" charset="0"/>
+                </a:endParaRPr>
+              </a:p>
+            </p:txBody>
+          </p:sp>
+          <p:pic>
+            <p:nvPicPr>
+              <p:cNvPr id="15" name="Picture 14">
+                <a:extLst>
+                  <a:ext uri="{FF2B5EF4-FFF2-40B4-BE49-F238E27FC236}">
+                    <a16:creationId xmlns:a16="http://schemas.microsoft.com/office/drawing/2014/main" id="{271E8977-1EA4-439B-BEA6-114566CF786D}"/>
+                  </a:ext>
+                </a:extLst>
+              </p:cNvPr>
+              <p:cNvPicPr>
+                <a:picLocks noChangeAspect="1"/>
+              </p:cNvPicPr>
+              <p:nvPr/>
+            </p:nvPicPr>
+            <p:blipFill>
+              <a:blip r:embed="rId2">
+                <a:extLst>
+                  <a:ext uri="{BEBA8EAE-BF5A-486C-A8C5-ECC9F3942E4B}">
+                    <a14:imgProps xmlns:a14="http://schemas.microsoft.com/office/drawing/2010/main">
+                      <a14:imgLayer r:embed="rId3">
+                        <a14:imgEffect>
+                          <a14:brightnessContrast contrast="40000"/>
+                        </a14:imgEffect>
+                      </a14:imgLayer>
+                    </a14:imgProps>
+                  </a:ext>
+                  <a:ext uri="{28A0092B-C50C-407E-A947-70E740481C1C}">
+                    <a14:useLocalDpi xmlns:a14="http://schemas.microsoft.com/office/drawing/2010/main" val="0"/>
+                  </a:ext>
+                </a:extLst>
+              </a:blip>
+              <a:stretch>
+                <a:fillRect/>
+              </a:stretch>
+            </p:blipFill>
+            <p:spPr>
+              <a:xfrm>
+                <a:off x="376179" y="1513444"/>
+                <a:ext cx="1303647" cy="1303647"/>
+              </a:xfrm>
+              <a:prstGeom prst="rect">
+                <a:avLst/>
+              </a:prstGeom>
+            </p:spPr>
+          </p:pic>
+          <p:grpSp>
+            <p:nvGrpSpPr>
+              <p:cNvPr id="30" name="Group 29">
+                <a:extLst>
+                  <a:ext uri="{FF2B5EF4-FFF2-40B4-BE49-F238E27FC236}">
+                    <a16:creationId xmlns:a16="http://schemas.microsoft.com/office/drawing/2014/main" id="{89252801-23C1-4A4C-B020-448359454919}"/>
+                  </a:ext>
+                </a:extLst>
+              </p:cNvPr>
+              <p:cNvGrpSpPr/>
+              <p:nvPr/>
+            </p:nvGrpSpPr>
+            <p:grpSpPr>
+              <a:xfrm>
+                <a:off x="1695974" y="5577430"/>
+                <a:ext cx="1043985" cy="471055"/>
+                <a:chOff x="1695974" y="5577430"/>
+                <a:chExt cx="1043985" cy="471055"/>
+              </a:xfrm>
+            </p:grpSpPr>
+            <p:pic>
+              <p:nvPicPr>
+                <p:cNvPr id="12" name="Picture 11">
+                  <a:extLst>
+                    <a:ext uri="{FF2B5EF4-FFF2-40B4-BE49-F238E27FC236}">
+                      <a16:creationId xmlns:a16="http://schemas.microsoft.com/office/drawing/2014/main" id="{2FE1249F-AB7C-4A4E-8493-765182617B04}"/>
+                    </a:ext>
+                  </a:extLst>
+                </p:cNvPr>
+                <p:cNvPicPr>
+                  <a:picLocks noChangeAspect="1"/>
+                </p:cNvPicPr>
+                <p:nvPr/>
+              </p:nvPicPr>
+              <p:blipFill rotWithShape="1">
+                <a:blip r:embed="rId4">
+                  <a:extLst>
+                    <a:ext uri="{BEBA8EAE-BF5A-486C-A8C5-ECC9F3942E4B}">
+                      <a14:imgProps xmlns:a14="http://schemas.microsoft.com/office/drawing/2010/main">
+                        <a14:imgLayer r:embed="rId5">
+                          <a14:imgEffect>
+                            <a14:artisticPlasticWrap/>
+                          </a14:imgEffect>
+                          <a14:imgEffect>
+                            <a14:colorTemperature colorTemp="11200"/>
+                          </a14:imgEffect>
+                          <a14:imgEffect>
+                            <a14:saturation sat="400000"/>
+                          </a14:imgEffect>
+                          <a14:imgEffect>
+                            <a14:brightnessContrast contrast="40000"/>
+                          </a14:imgEffect>
+                        </a14:imgLayer>
+                      </a14:imgProps>
+                    </a:ext>
+                    <a:ext uri="{28A0092B-C50C-407E-A947-70E740481C1C}">
+                      <a14:useLocalDpi xmlns:a14="http://schemas.microsoft.com/office/drawing/2010/main" val="0"/>
+                    </a:ext>
+                  </a:extLst>
+                </a:blip>
+                <a:srcRect l="28919" t="14445" r="31742" b="43757"/>
+                <a:stretch/>
+              </p:blipFill>
+              <p:spPr>
+                <a:xfrm>
+                  <a:off x="2296613" y="5577430"/>
+                  <a:ext cx="443346" cy="471055"/>
+                </a:xfrm>
+                <a:prstGeom prst="rect">
+                  <a:avLst/>
+                </a:prstGeom>
+              </p:spPr>
+            </p:pic>
+            <p:sp>
+              <p:nvSpPr>
+                <p:cNvPr id="28" name="TextBox 27">
+                  <a:extLst>
+                    <a:ext uri="{FF2B5EF4-FFF2-40B4-BE49-F238E27FC236}">
+                      <a16:creationId xmlns:a16="http://schemas.microsoft.com/office/drawing/2014/main" id="{605D5B81-0FBB-4094-AC15-C71A9209339E}"/>
+                    </a:ext>
+                  </a:extLst>
+                </p:cNvPr>
+                <p:cNvSpPr txBox="1"/>
+                <p:nvPr/>
+              </p:nvSpPr>
+              <p:spPr>
+                <a:xfrm>
+                  <a:off x="1695974" y="5582124"/>
+                  <a:ext cx="660758" cy="461665"/>
+                </a:xfrm>
+                <a:prstGeom prst="rect">
+                  <a:avLst/>
+                </a:prstGeom>
+                <a:noFill/>
+              </p:spPr>
+              <p:txBody>
+                <a:bodyPr wrap="none" rtlCol="0">
+                  <a:spAutoFit/>
+                </a:bodyPr>
+                <a:lstStyle/>
+                <a:p>
+                  <a:r>
+                    <a:rPr lang="en-US" sz="2400" b="1" dirty="0">
+                      <a:latin typeface="Algerian" panose="04020705040A02060702" pitchFamily="82" charset="0"/>
+                    </a:rPr>
+                    <a:t>1 x</a:t>
+                  </a:r>
+                </a:p>
+              </p:txBody>
+            </p:sp>
+          </p:grpSp>
+        </p:grpSp>
+        <p:pic>
+          <p:nvPicPr>
+            <p:cNvPr id="19" name="Picture 18">
+              <a:extLst>
+                <a:ext uri="{FF2B5EF4-FFF2-40B4-BE49-F238E27FC236}">
+                  <a16:creationId xmlns:a16="http://schemas.microsoft.com/office/drawing/2014/main" id="{374E674B-3F12-41DD-9C0F-4258E0D06A50}"/>
+                </a:ext>
+              </a:extLst>
+            </p:cNvPr>
+            <p:cNvPicPr>
+              <a:picLocks noChangeAspect="1"/>
+            </p:cNvPicPr>
+            <p:nvPr/>
+          </p:nvPicPr>
+          <p:blipFill>
+            <a:blip r:embed="rId6">
+              <a:clrChange>
+                <a:clrFrom>
+                  <a:srgbClr val="FFFFFF"/>
+                </a:clrFrom>
+                <a:clrTo>
+                  <a:srgbClr val="FFFFFF">
+                    <a:alpha val="0"/>
+                  </a:srgbClr>
+                </a:clrTo>
+              </a:clrChange>
+              <a:extLst>
+                <a:ext uri="{28A0092B-C50C-407E-A947-70E740481C1C}">
+                  <a14:useLocalDpi xmlns:a14="http://schemas.microsoft.com/office/drawing/2010/main" val="0"/>
+                </a:ext>
+              </a:extLst>
+            </a:blip>
+            <a:stretch>
+              <a:fillRect/>
+            </a:stretch>
+          </p:blipFill>
+          <p:spPr>
+            <a:xfrm>
+              <a:off x="581891" y="2975062"/>
+              <a:ext cx="892225" cy="1023934"/>
+            </a:xfrm>
+            <a:prstGeom prst="rect">
+              <a:avLst/>
+            </a:prstGeom>
+          </p:spPr>
+        </p:pic>
+        <p:pic>
+          <p:nvPicPr>
+            <p:cNvPr id="7" name="Picture 6">
+              <a:extLst>
+                <a:ext uri="{FF2B5EF4-FFF2-40B4-BE49-F238E27FC236}">
+                  <a16:creationId xmlns:a16="http://schemas.microsoft.com/office/drawing/2014/main" id="{58E69758-5A25-4F43-B2A5-AEAA65B0B461}"/>
+                </a:ext>
+              </a:extLst>
+            </p:cNvPr>
+            <p:cNvPicPr>
+              <a:picLocks noChangeAspect="1"/>
+            </p:cNvPicPr>
+            <p:nvPr/>
+          </p:nvPicPr>
+          <p:blipFill>
+            <a:blip r:embed="rId7">
+              <a:clrChange>
+                <a:clrFrom>
+                  <a:srgbClr val="FFFFFF"/>
+                </a:clrFrom>
+                <a:clrTo>
+                  <a:srgbClr val="FFFFFF">
+                    <a:alpha val="0"/>
+                  </a:srgbClr>
+                </a:clrTo>
+              </a:clrChange>
+              <a:extLst>
+                <a:ext uri="{28A0092B-C50C-407E-A947-70E740481C1C}">
+                  <a14:useLocalDpi xmlns:a14="http://schemas.microsoft.com/office/drawing/2010/main" val="0"/>
+                </a:ext>
+              </a:extLst>
+            </a:blip>
+            <a:stretch>
+              <a:fillRect/>
+            </a:stretch>
+          </p:blipFill>
+          <p:spPr>
+            <a:xfrm>
+              <a:off x="530440" y="4156967"/>
+              <a:ext cx="1023934" cy="1023934"/>
+            </a:xfrm>
+            <a:prstGeom prst="rect">
+              <a:avLst/>
+            </a:prstGeom>
+          </p:spPr>
+        </p:pic>
+      </p:grpSp>
+      <p:grpSp>
+        <p:nvGrpSpPr>
+          <p:cNvPr id="24" name="Group 23">
+            <a:extLst>
+              <a:ext uri="{FF2B5EF4-FFF2-40B4-BE49-F238E27FC236}">
+                <a16:creationId xmlns:a16="http://schemas.microsoft.com/office/drawing/2014/main" id="{FC1097AB-E6AF-4933-A7E9-1D0792E4EB31}"/>
+              </a:ext>
+            </a:extLst>
+          </p:cNvPr>
+          <p:cNvGrpSpPr/>
+          <p:nvPr/>
+        </p:nvGrpSpPr>
+        <p:grpSpPr>
+          <a:xfrm>
+            <a:off x="4433524" y="302135"/>
+            <a:ext cx="4132525" cy="5929179"/>
+            <a:chOff x="219821" y="302135"/>
+            <a:chExt cx="4132525" cy="5929179"/>
+          </a:xfrm>
+        </p:grpSpPr>
+        <p:grpSp>
+          <p:nvGrpSpPr>
+            <p:cNvPr id="25" name="Group 24">
+              <a:extLst>
+                <a:ext uri="{FF2B5EF4-FFF2-40B4-BE49-F238E27FC236}">
+                  <a16:creationId xmlns:a16="http://schemas.microsoft.com/office/drawing/2014/main" id="{004F3028-0426-42FA-AD01-58F964D5C407}"/>
+                </a:ext>
+              </a:extLst>
+            </p:cNvPr>
+            <p:cNvGrpSpPr/>
+            <p:nvPr/>
+          </p:nvGrpSpPr>
+          <p:grpSpPr>
+            <a:xfrm>
+              <a:off x="219821" y="302135"/>
+              <a:ext cx="4132525" cy="5929179"/>
+              <a:chOff x="219821" y="302135"/>
+              <a:chExt cx="4132525" cy="5929179"/>
+            </a:xfrm>
+          </p:grpSpPr>
+          <p:sp>
+            <p:nvSpPr>
+              <p:cNvPr id="31" name="Rectangle 30">
+                <a:extLst>
+                  <a:ext uri="{FF2B5EF4-FFF2-40B4-BE49-F238E27FC236}">
+                    <a16:creationId xmlns:a16="http://schemas.microsoft.com/office/drawing/2014/main" id="{D19C9FCE-C01B-410F-8204-5BFA55D5E182}"/>
+                  </a:ext>
+                </a:extLst>
+              </p:cNvPr>
+              <p:cNvSpPr/>
+              <p:nvPr/>
+            </p:nvSpPr>
+            <p:spPr>
+              <a:xfrm>
+                <a:off x="219821" y="302135"/>
+                <a:ext cx="4132525" cy="5929179"/>
+              </a:xfrm>
+              <a:prstGeom prst="rect">
+                <a:avLst/>
+              </a:prstGeom>
+              <a:solidFill>
+                <a:schemeClr val="bg1">
+                  <a:lumMod val="95000"/>
+                </a:schemeClr>
+              </a:solidFill>
+              <a:ln w="177800">
+                <a:solidFill>
+                  <a:schemeClr val="tx1"/>
+                </a:solidFill>
+              </a:ln>
+              <a:effectLst>
+                <a:softEdge rad="127000"/>
+              </a:effectLst>
+            </p:spPr>
+            <p:style>
+              <a:lnRef idx="2">
+                <a:schemeClr val="accent1">
+                  <a:shade val="50000"/>
+                </a:schemeClr>
+              </a:lnRef>
+              <a:fillRef idx="1">
+                <a:schemeClr val="accent1"/>
+              </a:fillRef>
+              <a:effectRef idx="0">
+                <a:schemeClr val="accent1"/>
+              </a:effectRef>
+              <a:fontRef idx="minor">
+                <a:schemeClr val="lt1"/>
+              </a:fontRef>
+            </p:style>
+            <p:txBody>
+              <a:bodyPr rtlCol="0" anchor="t"/>
+              <a:lstStyle/>
+              <a:p>
+                <a:pPr algn="ctr">
+                  <a:lnSpc>
+                    <a:spcPct val="200000"/>
+                  </a:lnSpc>
+                </a:pPr>
+                <a:r>
+                  <a:rPr lang="en-US" sz="4000" b="1" dirty="0">
+                    <a:solidFill>
+                      <a:schemeClr val="tx1"/>
+                    </a:solidFill>
+                    <a:latin typeface="Algerian" panose="04020705040A02060702" pitchFamily="82" charset="0"/>
+                  </a:rPr>
+                  <a:t>Beef nigiri :</a:t>
+                </a:r>
+                <a:endParaRPr lang="en-US" sz="4000" dirty="0">
+                  <a:solidFill>
+                    <a:schemeClr val="tx1"/>
+                  </a:solidFill>
+                  <a:latin typeface="Algerian" panose="04020705040A02060702" pitchFamily="82" charset="0"/>
+                </a:endParaRPr>
+              </a:p>
+              <a:p>
+                <a:pPr algn="ctr">
+                  <a:lnSpc>
+                    <a:spcPct val="200000"/>
+                  </a:lnSpc>
+                  <a:buSzPct val="150000"/>
+                </a:pPr>
+                <a:r>
+                  <a:rPr lang="en-US" sz="4000" dirty="0">
+                    <a:solidFill>
+                      <a:schemeClr val="tx1"/>
+                    </a:solidFill>
+                    <a:latin typeface="Algerian" panose="04020705040A02060702" pitchFamily="82" charset="0"/>
+                  </a:rPr>
+                  <a:t> meat</a:t>
+                </a:r>
+              </a:p>
+              <a:p>
+                <a:pPr algn="ctr">
+                  <a:lnSpc>
+                    <a:spcPct val="200000"/>
+                  </a:lnSpc>
+                  <a:buSzPct val="150000"/>
+                </a:pPr>
+                <a:r>
+                  <a:rPr lang="en-US" sz="4000" dirty="0">
+                    <a:solidFill>
+                      <a:schemeClr val="tx1"/>
+                    </a:solidFill>
+                    <a:latin typeface="Algerian" panose="04020705040A02060702" pitchFamily="82" charset="0"/>
+                  </a:rPr>
+                  <a:t>          fruit/veg</a:t>
+                </a:r>
+              </a:p>
+              <a:p>
+                <a:pPr algn="ctr">
+                  <a:lnSpc>
+                    <a:spcPct val="200000"/>
+                  </a:lnSpc>
+                  <a:buSzPct val="150000"/>
+                </a:pPr>
+                <a:r>
+                  <a:rPr lang="en-US" sz="4000" dirty="0">
+                    <a:solidFill>
+                      <a:schemeClr val="tx1"/>
+                    </a:solidFill>
+                    <a:latin typeface="Algerian" panose="04020705040A02060702" pitchFamily="82" charset="0"/>
+                  </a:rPr>
+                  <a:t>  grain</a:t>
+                </a:r>
+                <a:endParaRPr lang="en-US" sz="4800" dirty="0">
+                  <a:solidFill>
+                    <a:schemeClr val="tx1"/>
+                  </a:solidFill>
+                  <a:latin typeface="Algerian" panose="04020705040A02060702" pitchFamily="82" charset="0"/>
+                </a:endParaRPr>
+              </a:p>
+            </p:txBody>
+          </p:sp>
+          <p:pic>
+            <p:nvPicPr>
+              <p:cNvPr id="32" name="Picture 31">
+                <a:extLst>
+                  <a:ext uri="{FF2B5EF4-FFF2-40B4-BE49-F238E27FC236}">
+                    <a16:creationId xmlns:a16="http://schemas.microsoft.com/office/drawing/2014/main" id="{BBB6B205-09F6-4366-AF52-949E7BADB4C7}"/>
+                  </a:ext>
+                </a:extLst>
+              </p:cNvPr>
+              <p:cNvPicPr>
+                <a:picLocks noChangeAspect="1"/>
+              </p:cNvPicPr>
+              <p:nvPr/>
+            </p:nvPicPr>
+            <p:blipFill>
+              <a:blip r:embed="rId2">
+                <a:extLst>
+                  <a:ext uri="{BEBA8EAE-BF5A-486C-A8C5-ECC9F3942E4B}">
+                    <a14:imgProps xmlns:a14="http://schemas.microsoft.com/office/drawing/2010/main">
+                      <a14:imgLayer r:embed="rId3">
+                        <a14:imgEffect>
+                          <a14:brightnessContrast contrast="40000"/>
+                        </a14:imgEffect>
+                      </a14:imgLayer>
+                    </a14:imgProps>
+                  </a:ext>
+                  <a:ext uri="{28A0092B-C50C-407E-A947-70E740481C1C}">
+                    <a14:useLocalDpi xmlns:a14="http://schemas.microsoft.com/office/drawing/2010/main" val="0"/>
+                  </a:ext>
+                </a:extLst>
+              </a:blip>
+              <a:stretch>
+                <a:fillRect/>
+              </a:stretch>
+            </p:blipFill>
+            <p:spPr>
+              <a:xfrm>
+                <a:off x="376179" y="1513444"/>
+                <a:ext cx="1303647" cy="1303647"/>
+              </a:xfrm>
+              <a:prstGeom prst="rect">
+                <a:avLst/>
+              </a:prstGeom>
+            </p:spPr>
+          </p:pic>
+          <p:pic>
+            <p:nvPicPr>
+              <p:cNvPr id="34" name="Picture 33">
+                <a:extLst>
+                  <a:ext uri="{FF2B5EF4-FFF2-40B4-BE49-F238E27FC236}">
+                    <a16:creationId xmlns:a16="http://schemas.microsoft.com/office/drawing/2014/main" id="{ACD33541-348A-4DB4-A72E-740F3538C1EC}"/>
+                  </a:ext>
+                </a:extLst>
+              </p:cNvPr>
+              <p:cNvPicPr>
+                <a:picLocks noChangeAspect="1"/>
+              </p:cNvPicPr>
+              <p:nvPr/>
+            </p:nvPicPr>
+            <p:blipFill rotWithShape="1">
+              <a:blip r:embed="rId4">
+                <a:extLst>
+                  <a:ext uri="{BEBA8EAE-BF5A-486C-A8C5-ECC9F3942E4B}">
+                    <a14:imgProps xmlns:a14="http://schemas.microsoft.com/office/drawing/2010/main">
+                      <a14:imgLayer r:embed="rId5">
+                        <a14:imgEffect>
+                          <a14:artisticPlasticWrap/>
+                        </a14:imgEffect>
+                        <a14:imgEffect>
+                          <a14:colorTemperature colorTemp="11200"/>
+                        </a14:imgEffect>
+                        <a14:imgEffect>
+                          <a14:saturation sat="400000"/>
+                        </a14:imgEffect>
+                        <a14:imgEffect>
+                          <a14:brightnessContrast contrast="40000"/>
+                        </a14:imgEffect>
+                      </a14:imgLayer>
+                    </a14:imgProps>
+                  </a:ext>
+                  <a:ext uri="{28A0092B-C50C-407E-A947-70E740481C1C}">
+                    <a14:useLocalDpi xmlns:a14="http://schemas.microsoft.com/office/drawing/2010/main" val="0"/>
+                  </a:ext>
+                </a:extLst>
+              </a:blip>
+              <a:srcRect l="28919" t="14445" r="31742" b="43757"/>
+              <a:stretch/>
+            </p:blipFill>
+            <p:spPr>
+              <a:xfrm>
+                <a:off x="2064410" y="5577430"/>
+                <a:ext cx="443346" cy="471055"/>
+              </a:xfrm>
+              <a:prstGeom prst="rect">
+                <a:avLst/>
+              </a:prstGeom>
+            </p:spPr>
+          </p:pic>
+        </p:grpSp>
+        <p:pic>
+          <p:nvPicPr>
+            <p:cNvPr id="26" name="Picture 25">
+              <a:extLst>
+                <a:ext uri="{FF2B5EF4-FFF2-40B4-BE49-F238E27FC236}">
+                  <a16:creationId xmlns:a16="http://schemas.microsoft.com/office/drawing/2014/main" id="{8743E825-0200-4FE7-823E-A3EE14383A5D}"/>
+                </a:ext>
+              </a:extLst>
+            </p:cNvPr>
+            <p:cNvPicPr>
+              <a:picLocks noChangeAspect="1"/>
+            </p:cNvPicPr>
+            <p:nvPr/>
+          </p:nvPicPr>
+          <p:blipFill>
+            <a:blip r:embed="rId6">
+              <a:clrChange>
+                <a:clrFrom>
+                  <a:srgbClr val="FFFFFF"/>
+                </a:clrFrom>
+                <a:clrTo>
+                  <a:srgbClr val="FFFFFF">
+                    <a:alpha val="0"/>
+                  </a:srgbClr>
+                </a:clrTo>
+              </a:clrChange>
+              <a:extLst>
+                <a:ext uri="{28A0092B-C50C-407E-A947-70E740481C1C}">
+                  <a14:useLocalDpi xmlns:a14="http://schemas.microsoft.com/office/drawing/2010/main" val="0"/>
+                </a:ext>
+              </a:extLst>
+            </a:blip>
+            <a:stretch>
+              <a:fillRect/>
+            </a:stretch>
+          </p:blipFill>
+          <p:spPr>
+            <a:xfrm>
+              <a:off x="581891" y="2975062"/>
+              <a:ext cx="892225" cy="1023934"/>
+            </a:xfrm>
+            <a:prstGeom prst="rect">
+              <a:avLst/>
+            </a:prstGeom>
+          </p:spPr>
+        </p:pic>
+        <p:pic>
+          <p:nvPicPr>
+            <p:cNvPr id="29" name="Picture 28">
+              <a:extLst>
+                <a:ext uri="{FF2B5EF4-FFF2-40B4-BE49-F238E27FC236}">
+                  <a16:creationId xmlns:a16="http://schemas.microsoft.com/office/drawing/2014/main" id="{C33A8FFE-907A-482E-ACED-A035A735504B}"/>
+                </a:ext>
+              </a:extLst>
+            </p:cNvPr>
+            <p:cNvPicPr>
+              <a:picLocks noChangeAspect="1"/>
+            </p:cNvPicPr>
+            <p:nvPr/>
+          </p:nvPicPr>
+          <p:blipFill>
+            <a:blip r:embed="rId7">
+              <a:clrChange>
+                <a:clrFrom>
+                  <a:srgbClr val="FFFFFF"/>
+                </a:clrFrom>
+                <a:clrTo>
+                  <a:srgbClr val="FFFFFF">
+                    <a:alpha val="0"/>
+                  </a:srgbClr>
+                </a:clrTo>
+              </a:clrChange>
+              <a:extLst>
+                <a:ext uri="{28A0092B-C50C-407E-A947-70E740481C1C}">
+                  <a14:useLocalDpi xmlns:a14="http://schemas.microsoft.com/office/drawing/2010/main" val="0"/>
+                </a:ext>
+              </a:extLst>
+            </a:blip>
+            <a:stretch>
+              <a:fillRect/>
+            </a:stretch>
+          </p:blipFill>
+          <p:spPr>
+            <a:xfrm>
+              <a:off x="530440" y="4156967"/>
+              <a:ext cx="1023934" cy="1023934"/>
+            </a:xfrm>
+            <a:prstGeom prst="rect">
+              <a:avLst/>
+            </a:prstGeom>
+          </p:spPr>
+        </p:pic>
+      </p:grpSp>
+    </p:spTree>
+    <p:extLst>
+      <p:ext uri="{BB962C8B-B14F-4D97-AF65-F5344CB8AC3E}">
+        <p14:creationId xmlns:p14="http://schemas.microsoft.com/office/powerpoint/2010/main" val="596263107"/>
+      </p:ext>
+    </p:extLst>
+  </p:cSld>
+  <p:clrMapOvr>
+    <a:masterClrMapping/>
+  </p:clrMapOvr>
+</p:sld>
+</file>
+
 <file path=ppt/theme/theme1.xml><?xml version="1.0" encoding="utf-8"?>
 <a:theme xmlns:a="http://schemas.openxmlformats.org/drawingml/2006/main" name="Office Theme">
   <a:themeElements>

</xml_diff>